<commit_message>
Update Schematik (2 Radnabenmotoren vorne u. hinten)
</commit_message>
<xml_diff>
--- a/Projectmanagement/project_management_figures.pptx
+++ b/Projectmanagement/project_management_figures.pptx
@@ -4,6 +4,9 @@
   <p:sldMasterIdLst>
     <p:sldMasterId id="2147483648" r:id="rId1"/>
   </p:sldMasterIdLst>
+  <p:notesMasterIdLst>
+    <p:notesMasterId r:id="rId5"/>
+  </p:notesMasterIdLst>
   <p:sldIdLst>
     <p:sldId id="256" r:id="rId2"/>
     <p:sldId id="257" r:id="rId3"/>
@@ -9513,6 +9516,440 @@
 </dgm:styleDef>
 </file>
 
+<file path=ppt/notesMasters/notesMaster1.xml><?xml version="1.0" encoding="utf-8"?>
+<p:notesMaster xmlns:a="http://schemas.openxmlformats.org/drawingml/2006/main" xmlns:r="http://schemas.openxmlformats.org/officeDocument/2006/relationships" xmlns:p="http://schemas.openxmlformats.org/presentationml/2006/main">
+  <p:cSld>
+    <p:bg>
+      <p:bgRef idx="1001">
+        <a:schemeClr val="bg1"/>
+      </p:bgRef>
+    </p:bg>
+    <p:spTree>
+      <p:nvGrpSpPr>
+        <p:cNvPr id="1" name=""/>
+        <p:cNvGrpSpPr/>
+        <p:nvPr/>
+      </p:nvGrpSpPr>
+      <p:grpSpPr>
+        <a:xfrm>
+          <a:off x="0" y="0"/>
+          <a:ext cx="0" cy="0"/>
+          <a:chOff x="0" y="0"/>
+          <a:chExt cx="0" cy="0"/>
+        </a:xfrm>
+      </p:grpSpPr>
+      <p:sp>
+        <p:nvSpPr>
+          <p:cNvPr id="2" name="Kopfzeilenplatzhalter 1"/>
+          <p:cNvSpPr>
+            <a:spLocks noGrp="1"/>
+          </p:cNvSpPr>
+          <p:nvPr>
+            <p:ph type="hdr" sz="quarter"/>
+          </p:nvPr>
+        </p:nvSpPr>
+        <p:spPr>
+          <a:xfrm>
+            <a:off x="0" y="0"/>
+            <a:ext cx="2971800" cy="458788"/>
+          </a:xfrm>
+          <a:prstGeom prst="rect">
+            <a:avLst/>
+          </a:prstGeom>
+        </p:spPr>
+        <p:txBody>
+          <a:bodyPr vert="horz" lIns="91440" tIns="45720" rIns="91440" bIns="45720" rtlCol="0"/>
+          <a:lstStyle>
+            <a:lvl1pPr algn="l">
+              <a:defRPr sz="1200"/>
+            </a:lvl1pPr>
+          </a:lstStyle>
+          <a:p>
+            <a:endParaRPr lang="de-AT"/>
+          </a:p>
+        </p:txBody>
+      </p:sp>
+      <p:sp>
+        <p:nvSpPr>
+          <p:cNvPr id="3" name="Datumsplatzhalter 2"/>
+          <p:cNvSpPr>
+            <a:spLocks noGrp="1"/>
+          </p:cNvSpPr>
+          <p:nvPr>
+            <p:ph type="dt" idx="1"/>
+          </p:nvPr>
+        </p:nvSpPr>
+        <p:spPr>
+          <a:xfrm>
+            <a:off x="3884613" y="0"/>
+            <a:ext cx="2971800" cy="458788"/>
+          </a:xfrm>
+          <a:prstGeom prst="rect">
+            <a:avLst/>
+          </a:prstGeom>
+        </p:spPr>
+        <p:txBody>
+          <a:bodyPr vert="horz" lIns="91440" tIns="45720" rIns="91440" bIns="45720" rtlCol="0"/>
+          <a:lstStyle>
+            <a:lvl1pPr algn="r">
+              <a:defRPr sz="1200"/>
+            </a:lvl1pPr>
+          </a:lstStyle>
+          <a:p>
+            <a:fld id="{E0595262-AD1F-4F89-BA9B-59C689EA9F1C}" type="datetimeFigureOut">
+              <a:rPr lang="de-AT" smtClean="0"/>
+              <a:t>26.10.2024</a:t>
+            </a:fld>
+            <a:endParaRPr lang="de-AT"/>
+          </a:p>
+        </p:txBody>
+      </p:sp>
+      <p:sp>
+        <p:nvSpPr>
+          <p:cNvPr id="4" name="Folienbildplatzhalter 3"/>
+          <p:cNvSpPr>
+            <a:spLocks noGrp="1" noRot="1" noChangeAspect="1"/>
+          </p:cNvSpPr>
+          <p:nvPr>
+            <p:ph type="sldImg" idx="2"/>
+          </p:nvPr>
+        </p:nvSpPr>
+        <p:spPr>
+          <a:xfrm>
+            <a:off x="685800" y="1143000"/>
+            <a:ext cx="5486400" cy="3086100"/>
+          </a:xfrm>
+          <a:prstGeom prst="rect">
+            <a:avLst/>
+          </a:prstGeom>
+          <a:noFill/>
+          <a:ln w="12700">
+            <a:solidFill>
+              <a:prstClr val="black"/>
+            </a:solidFill>
+          </a:ln>
+        </p:spPr>
+        <p:txBody>
+          <a:bodyPr vert="horz" lIns="91440" tIns="45720" rIns="91440" bIns="45720" rtlCol="0" anchor="ctr"/>
+          <a:lstStyle/>
+          <a:p>
+            <a:endParaRPr lang="de-AT"/>
+          </a:p>
+        </p:txBody>
+      </p:sp>
+      <p:sp>
+        <p:nvSpPr>
+          <p:cNvPr id="5" name="Notizenplatzhalter 4"/>
+          <p:cNvSpPr>
+            <a:spLocks noGrp="1"/>
+          </p:cNvSpPr>
+          <p:nvPr>
+            <p:ph type="body" sz="quarter" idx="3"/>
+          </p:nvPr>
+        </p:nvSpPr>
+        <p:spPr>
+          <a:xfrm>
+            <a:off x="685800" y="4400550"/>
+            <a:ext cx="5486400" cy="3600450"/>
+          </a:xfrm>
+          <a:prstGeom prst="rect">
+            <a:avLst/>
+          </a:prstGeom>
+        </p:spPr>
+        <p:txBody>
+          <a:bodyPr vert="horz" lIns="91440" tIns="45720" rIns="91440" bIns="45720" rtlCol="0"/>
+          <a:lstStyle/>
+          <a:p>
+            <a:pPr lvl="0"/>
+            <a:r>
+              <a:rPr lang="de-DE"/>
+              <a:t>Mastertextformat bearbeiten</a:t>
+            </a:r>
+          </a:p>
+          <a:p>
+            <a:pPr lvl="1"/>
+            <a:r>
+              <a:rPr lang="de-DE"/>
+              <a:t>Zweite Ebene</a:t>
+            </a:r>
+          </a:p>
+          <a:p>
+            <a:pPr lvl="2"/>
+            <a:r>
+              <a:rPr lang="de-DE"/>
+              <a:t>Dritte Ebene</a:t>
+            </a:r>
+          </a:p>
+          <a:p>
+            <a:pPr lvl="3"/>
+            <a:r>
+              <a:rPr lang="de-DE"/>
+              <a:t>Vierte Ebene</a:t>
+            </a:r>
+          </a:p>
+          <a:p>
+            <a:pPr lvl="4"/>
+            <a:r>
+              <a:rPr lang="de-DE"/>
+              <a:t>Fünfte Ebene</a:t>
+            </a:r>
+            <a:endParaRPr lang="de-AT"/>
+          </a:p>
+        </p:txBody>
+      </p:sp>
+      <p:sp>
+        <p:nvSpPr>
+          <p:cNvPr id="6" name="Fußzeilenplatzhalter 5"/>
+          <p:cNvSpPr>
+            <a:spLocks noGrp="1"/>
+          </p:cNvSpPr>
+          <p:nvPr>
+            <p:ph type="ftr" sz="quarter" idx="4"/>
+          </p:nvPr>
+        </p:nvSpPr>
+        <p:spPr>
+          <a:xfrm>
+            <a:off x="0" y="8685213"/>
+            <a:ext cx="2971800" cy="458787"/>
+          </a:xfrm>
+          <a:prstGeom prst="rect">
+            <a:avLst/>
+          </a:prstGeom>
+        </p:spPr>
+        <p:txBody>
+          <a:bodyPr vert="horz" lIns="91440" tIns="45720" rIns="91440" bIns="45720" rtlCol="0" anchor="b"/>
+          <a:lstStyle>
+            <a:lvl1pPr algn="l">
+              <a:defRPr sz="1200"/>
+            </a:lvl1pPr>
+          </a:lstStyle>
+          <a:p>
+            <a:endParaRPr lang="de-AT"/>
+          </a:p>
+        </p:txBody>
+      </p:sp>
+      <p:sp>
+        <p:nvSpPr>
+          <p:cNvPr id="7" name="Foliennummernplatzhalter 6"/>
+          <p:cNvSpPr>
+            <a:spLocks noGrp="1"/>
+          </p:cNvSpPr>
+          <p:nvPr>
+            <p:ph type="sldNum" sz="quarter" idx="5"/>
+          </p:nvPr>
+        </p:nvSpPr>
+        <p:spPr>
+          <a:xfrm>
+            <a:off x="3884613" y="8685213"/>
+            <a:ext cx="2971800" cy="458787"/>
+          </a:xfrm>
+          <a:prstGeom prst="rect">
+            <a:avLst/>
+          </a:prstGeom>
+        </p:spPr>
+        <p:txBody>
+          <a:bodyPr vert="horz" lIns="91440" tIns="45720" rIns="91440" bIns="45720" rtlCol="0" anchor="b"/>
+          <a:lstStyle>
+            <a:lvl1pPr algn="r">
+              <a:defRPr sz="1200"/>
+            </a:lvl1pPr>
+          </a:lstStyle>
+          <a:p>
+            <a:fld id="{16F8E2D4-EE73-423B-86AE-2981902DB6B8}" type="slidenum">
+              <a:rPr lang="de-AT" smtClean="0"/>
+              <a:t>‹Nr.›</a:t>
+            </a:fld>
+            <a:endParaRPr lang="de-AT"/>
+          </a:p>
+        </p:txBody>
+      </p:sp>
+    </p:spTree>
+    <p:extLst>
+      <p:ext uri="{BB962C8B-B14F-4D97-AF65-F5344CB8AC3E}">
+        <p14:creationId xmlns:p14="http://schemas.microsoft.com/office/powerpoint/2010/main" val="963914938"/>
+      </p:ext>
+    </p:extLst>
+  </p:cSld>
+  <p:clrMap bg1="lt1" tx1="dk1" bg2="lt2" tx2="dk2" accent1="accent1" accent2="accent2" accent3="accent3" accent4="accent4" accent5="accent5" accent6="accent6" hlink="hlink" folHlink="folHlink"/>
+  <p:notesStyle>
+    <a:lvl1pPr marL="0" algn="l" defTabSz="914400" rtl="0" eaLnBrk="1" latinLnBrk="0" hangingPunct="1">
+      <a:defRPr sz="1200" kern="1200">
+        <a:solidFill>
+          <a:schemeClr val="tx1"/>
+        </a:solidFill>
+        <a:latin typeface="+mn-lt"/>
+        <a:ea typeface="+mn-ea"/>
+        <a:cs typeface="+mn-cs"/>
+      </a:defRPr>
+    </a:lvl1pPr>
+    <a:lvl2pPr marL="457200" algn="l" defTabSz="914400" rtl="0" eaLnBrk="1" latinLnBrk="0" hangingPunct="1">
+      <a:defRPr sz="1200" kern="1200">
+        <a:solidFill>
+          <a:schemeClr val="tx1"/>
+        </a:solidFill>
+        <a:latin typeface="+mn-lt"/>
+        <a:ea typeface="+mn-ea"/>
+        <a:cs typeface="+mn-cs"/>
+      </a:defRPr>
+    </a:lvl2pPr>
+    <a:lvl3pPr marL="914400" algn="l" defTabSz="914400" rtl="0" eaLnBrk="1" latinLnBrk="0" hangingPunct="1">
+      <a:defRPr sz="1200" kern="1200">
+        <a:solidFill>
+          <a:schemeClr val="tx1"/>
+        </a:solidFill>
+        <a:latin typeface="+mn-lt"/>
+        <a:ea typeface="+mn-ea"/>
+        <a:cs typeface="+mn-cs"/>
+      </a:defRPr>
+    </a:lvl3pPr>
+    <a:lvl4pPr marL="1371600" algn="l" defTabSz="914400" rtl="0" eaLnBrk="1" latinLnBrk="0" hangingPunct="1">
+      <a:defRPr sz="1200" kern="1200">
+        <a:solidFill>
+          <a:schemeClr val="tx1"/>
+        </a:solidFill>
+        <a:latin typeface="+mn-lt"/>
+        <a:ea typeface="+mn-ea"/>
+        <a:cs typeface="+mn-cs"/>
+      </a:defRPr>
+    </a:lvl4pPr>
+    <a:lvl5pPr marL="1828800" algn="l" defTabSz="914400" rtl="0" eaLnBrk="1" latinLnBrk="0" hangingPunct="1">
+      <a:defRPr sz="1200" kern="1200">
+        <a:solidFill>
+          <a:schemeClr val="tx1"/>
+        </a:solidFill>
+        <a:latin typeface="+mn-lt"/>
+        <a:ea typeface="+mn-ea"/>
+        <a:cs typeface="+mn-cs"/>
+      </a:defRPr>
+    </a:lvl5pPr>
+    <a:lvl6pPr marL="2286000" algn="l" defTabSz="914400" rtl="0" eaLnBrk="1" latinLnBrk="0" hangingPunct="1">
+      <a:defRPr sz="1200" kern="1200">
+        <a:solidFill>
+          <a:schemeClr val="tx1"/>
+        </a:solidFill>
+        <a:latin typeface="+mn-lt"/>
+        <a:ea typeface="+mn-ea"/>
+        <a:cs typeface="+mn-cs"/>
+      </a:defRPr>
+    </a:lvl6pPr>
+    <a:lvl7pPr marL="2743200" algn="l" defTabSz="914400" rtl="0" eaLnBrk="1" latinLnBrk="0" hangingPunct="1">
+      <a:defRPr sz="1200" kern="1200">
+        <a:solidFill>
+          <a:schemeClr val="tx1"/>
+        </a:solidFill>
+        <a:latin typeface="+mn-lt"/>
+        <a:ea typeface="+mn-ea"/>
+        <a:cs typeface="+mn-cs"/>
+      </a:defRPr>
+    </a:lvl7pPr>
+    <a:lvl8pPr marL="3200400" algn="l" defTabSz="914400" rtl="0" eaLnBrk="1" latinLnBrk="0" hangingPunct="1">
+      <a:defRPr sz="1200" kern="1200">
+        <a:solidFill>
+          <a:schemeClr val="tx1"/>
+        </a:solidFill>
+        <a:latin typeface="+mn-lt"/>
+        <a:ea typeface="+mn-ea"/>
+        <a:cs typeface="+mn-cs"/>
+      </a:defRPr>
+    </a:lvl8pPr>
+    <a:lvl9pPr marL="3657600" algn="l" defTabSz="914400" rtl="0" eaLnBrk="1" latinLnBrk="0" hangingPunct="1">
+      <a:defRPr sz="1200" kern="1200">
+        <a:solidFill>
+          <a:schemeClr val="tx1"/>
+        </a:solidFill>
+        <a:latin typeface="+mn-lt"/>
+        <a:ea typeface="+mn-ea"/>
+        <a:cs typeface="+mn-cs"/>
+      </a:defRPr>
+    </a:lvl9pPr>
+  </p:notesStyle>
+</p:notesMaster>
+</file>
+
+<file path=ppt/notesSlides/notesSlide1.xml><?xml version="1.0" encoding="utf-8"?>
+<p:notes xmlns:a="http://schemas.openxmlformats.org/drawingml/2006/main" xmlns:r="http://schemas.openxmlformats.org/officeDocument/2006/relationships" xmlns:p="http://schemas.openxmlformats.org/presentationml/2006/main">
+  <p:cSld>
+    <p:spTree>
+      <p:nvGrpSpPr>
+        <p:cNvPr id="1" name=""/>
+        <p:cNvGrpSpPr/>
+        <p:nvPr/>
+      </p:nvGrpSpPr>
+      <p:grpSpPr>
+        <a:xfrm>
+          <a:off x="0" y="0"/>
+          <a:ext cx="0" cy="0"/>
+          <a:chOff x="0" y="0"/>
+          <a:chExt cx="0" cy="0"/>
+        </a:xfrm>
+      </p:grpSpPr>
+      <p:sp>
+        <p:nvSpPr>
+          <p:cNvPr id="2" name="Folienbildplatzhalter 1"/>
+          <p:cNvSpPr>
+            <a:spLocks noGrp="1" noRot="1" noChangeAspect="1"/>
+          </p:cNvSpPr>
+          <p:nvPr>
+            <p:ph type="sldImg"/>
+          </p:nvPr>
+        </p:nvSpPr>
+        <p:spPr/>
+      </p:sp>
+      <p:sp>
+        <p:nvSpPr>
+          <p:cNvPr id="3" name="Notizenplatzhalter 2"/>
+          <p:cNvSpPr>
+            <a:spLocks noGrp="1"/>
+          </p:cNvSpPr>
+          <p:nvPr>
+            <p:ph type="body" idx="1"/>
+          </p:nvPr>
+        </p:nvSpPr>
+        <p:spPr/>
+        <p:txBody>
+          <a:bodyPr/>
+          <a:lstStyle/>
+          <a:p>
+            <a:endParaRPr lang="de-AT" dirty="0"/>
+          </a:p>
+        </p:txBody>
+      </p:sp>
+      <p:sp>
+        <p:nvSpPr>
+          <p:cNvPr id="4" name="Foliennummernplatzhalter 3"/>
+          <p:cNvSpPr>
+            <a:spLocks noGrp="1"/>
+          </p:cNvSpPr>
+          <p:nvPr>
+            <p:ph type="sldNum" sz="quarter" idx="5"/>
+          </p:nvPr>
+        </p:nvSpPr>
+        <p:spPr/>
+        <p:txBody>
+          <a:bodyPr/>
+          <a:lstStyle/>
+          <a:p>
+            <a:fld id="{16F8E2D4-EE73-423B-86AE-2981902DB6B8}" type="slidenum">
+              <a:rPr lang="de-AT" smtClean="0"/>
+              <a:t>3</a:t>
+            </a:fld>
+            <a:endParaRPr lang="de-AT"/>
+          </a:p>
+        </p:txBody>
+      </p:sp>
+    </p:spTree>
+    <p:extLst>
+      <p:ext uri="{BB962C8B-B14F-4D97-AF65-F5344CB8AC3E}">
+        <p14:creationId xmlns:p14="http://schemas.microsoft.com/office/powerpoint/2010/main" val="2294895338"/>
+      </p:ext>
+    </p:extLst>
+  </p:cSld>
+  <p:clrMapOvr>
+    <a:masterClrMapping/>
+  </p:clrMapOvr>
+</p:notes>
+</file>
+
 <file path=ppt/slideLayouts/slideLayout1.xml><?xml version="1.0" encoding="utf-8"?>
 <p:sldLayout xmlns:a="http://schemas.openxmlformats.org/drawingml/2006/main" xmlns:r="http://schemas.openxmlformats.org/officeDocument/2006/relationships" xmlns:p="http://schemas.openxmlformats.org/presentationml/2006/main" type="title" preserve="1">
   <p:cSld name="Titelfolie">
@@ -9662,7 +10099,7 @@
           <a:p>
             <a:fld id="{ADBB3E84-333E-4841-847D-38F1CA94A2ED}" type="datetimeFigureOut">
               <a:rPr lang="de-AT" smtClean="0"/>
-              <a:t>13.10.2024</a:t>
+              <a:t>26.10.2024</a:t>
             </a:fld>
             <a:endParaRPr lang="de-AT"/>
           </a:p>
@@ -9862,7 +10299,7 @@
           <a:p>
             <a:fld id="{ADBB3E84-333E-4841-847D-38F1CA94A2ED}" type="datetimeFigureOut">
               <a:rPr lang="de-AT" smtClean="0"/>
-              <a:t>13.10.2024</a:t>
+              <a:t>26.10.2024</a:t>
             </a:fld>
             <a:endParaRPr lang="de-AT"/>
           </a:p>
@@ -10072,7 +10509,7 @@
           <a:p>
             <a:fld id="{ADBB3E84-333E-4841-847D-38F1CA94A2ED}" type="datetimeFigureOut">
               <a:rPr lang="de-AT" smtClean="0"/>
-              <a:t>13.10.2024</a:t>
+              <a:t>26.10.2024</a:t>
             </a:fld>
             <a:endParaRPr lang="de-AT"/>
           </a:p>
@@ -10272,7 +10709,7 @@
           <a:p>
             <a:fld id="{ADBB3E84-333E-4841-847D-38F1CA94A2ED}" type="datetimeFigureOut">
               <a:rPr lang="de-AT" smtClean="0"/>
-              <a:t>13.10.2024</a:t>
+              <a:t>26.10.2024</a:t>
             </a:fld>
             <a:endParaRPr lang="de-AT"/>
           </a:p>
@@ -10548,7 +10985,7 @@
           <a:p>
             <a:fld id="{ADBB3E84-333E-4841-847D-38F1CA94A2ED}" type="datetimeFigureOut">
               <a:rPr lang="de-AT" smtClean="0"/>
-              <a:t>13.10.2024</a:t>
+              <a:t>26.10.2024</a:t>
             </a:fld>
             <a:endParaRPr lang="de-AT"/>
           </a:p>
@@ -10816,7 +11253,7 @@
           <a:p>
             <a:fld id="{ADBB3E84-333E-4841-847D-38F1CA94A2ED}" type="datetimeFigureOut">
               <a:rPr lang="de-AT" smtClean="0"/>
-              <a:t>13.10.2024</a:t>
+              <a:t>26.10.2024</a:t>
             </a:fld>
             <a:endParaRPr lang="de-AT"/>
           </a:p>
@@ -11231,7 +11668,7 @@
           <a:p>
             <a:fld id="{ADBB3E84-333E-4841-847D-38F1CA94A2ED}" type="datetimeFigureOut">
               <a:rPr lang="de-AT" smtClean="0"/>
-              <a:t>13.10.2024</a:t>
+              <a:t>26.10.2024</a:t>
             </a:fld>
             <a:endParaRPr lang="de-AT"/>
           </a:p>
@@ -11373,7 +11810,7 @@
           <a:p>
             <a:fld id="{ADBB3E84-333E-4841-847D-38F1CA94A2ED}" type="datetimeFigureOut">
               <a:rPr lang="de-AT" smtClean="0"/>
-              <a:t>13.10.2024</a:t>
+              <a:t>26.10.2024</a:t>
             </a:fld>
             <a:endParaRPr lang="de-AT"/>
           </a:p>
@@ -11486,7 +11923,7 @@
           <a:p>
             <a:fld id="{ADBB3E84-333E-4841-847D-38F1CA94A2ED}" type="datetimeFigureOut">
               <a:rPr lang="de-AT" smtClean="0"/>
-              <a:t>13.10.2024</a:t>
+              <a:t>26.10.2024</a:t>
             </a:fld>
             <a:endParaRPr lang="de-AT"/>
           </a:p>
@@ -11799,7 +12236,7 @@
           <a:p>
             <a:fld id="{ADBB3E84-333E-4841-847D-38F1CA94A2ED}" type="datetimeFigureOut">
               <a:rPr lang="de-AT" smtClean="0"/>
-              <a:t>13.10.2024</a:t>
+              <a:t>26.10.2024</a:t>
             </a:fld>
             <a:endParaRPr lang="de-AT"/>
           </a:p>
@@ -12088,7 +12525,7 @@
           <a:p>
             <a:fld id="{ADBB3E84-333E-4841-847D-38F1CA94A2ED}" type="datetimeFigureOut">
               <a:rPr lang="de-AT" smtClean="0"/>
-              <a:t>13.10.2024</a:t>
+              <a:t>26.10.2024</a:t>
             </a:fld>
             <a:endParaRPr lang="de-AT"/>
           </a:p>
@@ -12331,7 +12768,7 @@
           <a:p>
             <a:fld id="{ADBB3E84-333E-4841-847D-38F1CA94A2ED}" type="datetimeFigureOut">
               <a:rPr lang="de-AT" smtClean="0"/>
-              <a:t>13.10.2024</a:t>
+              <a:t>26.10.2024</a:t>
             </a:fld>
             <a:endParaRPr lang="de-AT"/>
           </a:p>
@@ -12915,42 +13352,6 @@
           <p:nvPr/>
         </p:nvPicPr>
         <p:blipFill>
-          <a:blip r:embed="rId2">
-            <a:extLst>
-              <a:ext uri="{28A0092B-C50C-407E-A947-70E740481C1C}">
-                <a14:useLocalDpi xmlns:a14="http://schemas.microsoft.com/office/drawing/2010/main" val="0"/>
-              </a:ext>
-            </a:extLst>
-          </a:blip>
-          <a:stretch>
-            <a:fillRect/>
-          </a:stretch>
-        </p:blipFill>
-        <p:spPr>
-          <a:xfrm>
-            <a:off x="-115384" y="1275091"/>
-            <a:ext cx="7430144" cy="5738357"/>
-          </a:xfrm>
-          <a:prstGeom prst="rect">
-            <a:avLst/>
-          </a:prstGeom>
-        </p:spPr>
-      </p:pic>
-      <p:pic>
-        <p:nvPicPr>
-          <p:cNvPr id="7" name="Grafik 6" descr="Ein Bild, das Schaltung, Elektronisches Bauteil, Elektrisches Bauelement, passives Bauelement enthält.&#10;&#10;Automatisch generierte Beschreibung">
-            <a:extLst>
-              <a:ext uri="{FF2B5EF4-FFF2-40B4-BE49-F238E27FC236}">
-                <a16:creationId xmlns:a16="http://schemas.microsoft.com/office/drawing/2014/main" id="{D03AF767-89FD-F066-25F0-1D0AA15744AD}"/>
-              </a:ext>
-            </a:extLst>
-          </p:cNvPr>
-          <p:cNvPicPr>
-            <a:picLocks noChangeAspect="1"/>
-          </p:cNvPicPr>
-          <p:nvPr/>
-        </p:nvPicPr>
-        <p:blipFill>
           <a:blip r:embed="rId3">
             <a:extLst>
               <a:ext uri="{28A0092B-C50C-407E-A947-70E740481C1C}">
@@ -12964,8 +13365,8 @@
         </p:blipFill>
         <p:spPr>
           <a:xfrm>
-            <a:off x="6724460" y="2411516"/>
-            <a:ext cx="1016232" cy="1016232"/>
+            <a:off x="-115384" y="2075109"/>
+            <a:ext cx="6394264" cy="4938339"/>
           </a:xfrm>
           <a:prstGeom prst="rect">
             <a:avLst/>
@@ -12974,10 +13375,10 @@
       </p:pic>
       <p:pic>
         <p:nvPicPr>
-          <p:cNvPr id="9" name="Grafik 8" descr="Ein Bild, das Text, Elektronik, Computerkomponenten, Elektrisches Bauelement enthält.&#10;&#10;Automatisch generierte Beschreibung">
+          <p:cNvPr id="13" name="Grafik 12" descr="Ein Bild, das Mobiliar, Text, Stuhl enthält.&#10;&#10;Automatisch generierte Beschreibung">
             <a:extLst>
               <a:ext uri="{FF2B5EF4-FFF2-40B4-BE49-F238E27FC236}">
-                <a16:creationId xmlns:a16="http://schemas.microsoft.com/office/drawing/2014/main" id="{58A00886-AA57-EA89-F094-771576224901}"/>
+                <a16:creationId xmlns:a16="http://schemas.microsoft.com/office/drawing/2014/main" id="{C0A447EB-21F6-ADBF-4B91-B987656F810E}"/>
               </a:ext>
             </a:extLst>
           </p:cNvPr>
@@ -13000,116 +13401,8 @@
         </p:blipFill>
         <p:spPr>
           <a:xfrm>
-            <a:off x="6747901" y="965392"/>
-            <a:ext cx="978123" cy="1016232"/>
-          </a:xfrm>
-          <a:prstGeom prst="rect">
-            <a:avLst/>
-          </a:prstGeom>
-        </p:spPr>
-      </p:pic>
-      <p:pic>
-        <p:nvPicPr>
-          <p:cNvPr id="11" name="Grafik 10" descr="Ein Bild, das Schaltung, Elektronik, Maschine, Elektronisches Bauteil enthält.&#10;&#10;Automatisch generierte Beschreibung">
-            <a:extLst>
-              <a:ext uri="{FF2B5EF4-FFF2-40B4-BE49-F238E27FC236}">
-                <a16:creationId xmlns:a16="http://schemas.microsoft.com/office/drawing/2014/main" id="{2E0768C6-200F-B911-8BD7-505B5D31E906}"/>
-              </a:ext>
-            </a:extLst>
-          </p:cNvPr>
-          <p:cNvPicPr>
-            <a:picLocks noChangeAspect="1"/>
-          </p:cNvPicPr>
-          <p:nvPr/>
-        </p:nvPicPr>
-        <p:blipFill>
-          <a:blip r:embed="rId5">
-            <a:extLst>
-              <a:ext uri="{28A0092B-C50C-407E-A947-70E740481C1C}">
-                <a14:useLocalDpi xmlns:a14="http://schemas.microsoft.com/office/drawing/2010/main" val="0"/>
-              </a:ext>
-            </a:extLst>
-          </a:blip>
-          <a:stretch>
-            <a:fillRect/>
-          </a:stretch>
-        </p:blipFill>
-        <p:spPr>
-          <a:xfrm>
-            <a:off x="5168819" y="936763"/>
-            <a:ext cx="1023052" cy="1016232"/>
-          </a:xfrm>
-          <a:prstGeom prst="rect">
-            <a:avLst/>
-          </a:prstGeom>
-        </p:spPr>
-      </p:pic>
-      <p:pic>
-        <p:nvPicPr>
-          <p:cNvPr id="13" name="Grafik 12" descr="Ein Bild, das Mobiliar, Text, Stuhl enthält.&#10;&#10;Automatisch generierte Beschreibung">
-            <a:extLst>
-              <a:ext uri="{FF2B5EF4-FFF2-40B4-BE49-F238E27FC236}">
-                <a16:creationId xmlns:a16="http://schemas.microsoft.com/office/drawing/2014/main" id="{C0A447EB-21F6-ADBF-4B91-B987656F810E}"/>
-              </a:ext>
-            </a:extLst>
-          </p:cNvPr>
-          <p:cNvPicPr>
-            <a:picLocks noChangeAspect="1"/>
-          </p:cNvPicPr>
-          <p:nvPr/>
-        </p:nvPicPr>
-        <p:blipFill>
-          <a:blip r:embed="rId6">
-            <a:extLst>
-              <a:ext uri="{28A0092B-C50C-407E-A947-70E740481C1C}">
-                <a14:useLocalDpi xmlns:a14="http://schemas.microsoft.com/office/drawing/2010/main" val="0"/>
-              </a:ext>
-            </a:extLst>
-          </a:blip>
-          <a:stretch>
-            <a:fillRect/>
-          </a:stretch>
-        </p:blipFill>
-        <p:spPr>
-          <a:xfrm>
-            <a:off x="5319029" y="2269784"/>
+            <a:off x="6415571" y="3032528"/>
             <a:ext cx="722631" cy="1299696"/>
-          </a:xfrm>
-          <a:prstGeom prst="rect">
-            <a:avLst/>
-          </a:prstGeom>
-        </p:spPr>
-      </p:pic>
-      <p:pic>
-        <p:nvPicPr>
-          <p:cNvPr id="15" name="Grafik 14">
-            <a:extLst>
-              <a:ext uri="{FF2B5EF4-FFF2-40B4-BE49-F238E27FC236}">
-                <a16:creationId xmlns:a16="http://schemas.microsoft.com/office/drawing/2014/main" id="{220F9EAF-9C3F-C287-124F-A4E2F95CC203}"/>
-              </a:ext>
-            </a:extLst>
-          </p:cNvPr>
-          <p:cNvPicPr>
-            <a:picLocks noChangeAspect="1"/>
-          </p:cNvPicPr>
-          <p:nvPr/>
-        </p:nvPicPr>
-        <p:blipFill>
-          <a:blip r:embed="rId7">
-            <a:extLst>
-              <a:ext uri="{28A0092B-C50C-407E-A947-70E740481C1C}">
-                <a14:useLocalDpi xmlns:a14="http://schemas.microsoft.com/office/drawing/2010/main" val="0"/>
-              </a:ext>
-            </a:extLst>
-          </a:blip>
-          <a:stretch>
-            <a:fillRect/>
-          </a:stretch>
-        </p:blipFill>
-        <p:spPr>
-          <a:xfrm>
-            <a:off x="1596361" y="287036"/>
-            <a:ext cx="1646513" cy="1096436"/>
           </a:xfrm>
           <a:prstGeom prst="rect">
             <a:avLst/>
@@ -13130,8 +13423,8 @@
         </p:nvSpPr>
         <p:spPr>
           <a:xfrm>
-            <a:off x="1188718" y="0"/>
-            <a:ext cx="2489849" cy="369332"/>
+            <a:off x="585415" y="247941"/>
+            <a:ext cx="1808700" cy="646331"/>
           </a:xfrm>
           <a:prstGeom prst="rect">
             <a:avLst/>
@@ -13144,9 +13437,17 @@
           </a:bodyPr>
           <a:lstStyle/>
           <a:p>
+            <a:pPr algn="ctr"/>
             <a:r>
               <a:rPr lang="de-AT" dirty="0"/>
-              <a:t>Bürstenloser DC-Motor</a:t>
+              <a:t>BLDC-</a:t>
+            </a:r>
+          </a:p>
+          <a:p>
+            <a:pPr algn="ctr"/>
+            <a:r>
+              <a:rPr lang="de-AT" dirty="0"/>
+              <a:t>Radnabenmotor</a:t>
             </a:r>
           </a:p>
         </p:txBody>
@@ -13165,8 +13466,8 @@
         </p:nvSpPr>
         <p:spPr>
           <a:xfrm>
-            <a:off x="4919472" y="594360"/>
-            <a:ext cx="2880360" cy="2990088"/>
+            <a:off x="4603239" y="212344"/>
+            <a:ext cx="2880360" cy="4119880"/>
           </a:xfrm>
           <a:prstGeom prst="rect">
             <a:avLst/>
@@ -13200,41 +13501,6 @@
       </p:sp>
       <p:sp>
         <p:nvSpPr>
-          <p:cNvPr id="18" name="Textfeld 17">
-            <a:extLst>
-              <a:ext uri="{FF2B5EF4-FFF2-40B4-BE49-F238E27FC236}">
-                <a16:creationId xmlns:a16="http://schemas.microsoft.com/office/drawing/2014/main" id="{67EF5574-7469-D22A-80E1-E17D6E15D1DC}"/>
-              </a:ext>
-            </a:extLst>
-          </p:cNvPr>
-          <p:cNvSpPr txBox="1"/>
-          <p:nvPr/>
-        </p:nvSpPr>
-        <p:spPr>
-          <a:xfrm>
-            <a:off x="5112507" y="628986"/>
-            <a:ext cx="943528" cy="307777"/>
-          </a:xfrm>
-          <a:prstGeom prst="rect">
-            <a:avLst/>
-          </a:prstGeom>
-          <a:noFill/>
-        </p:spPr>
-        <p:txBody>
-          <a:bodyPr wrap="none" rtlCol="0">
-            <a:spAutoFit/>
-          </a:bodyPr>
-          <a:lstStyle/>
-          <a:p>
-            <a:r>
-              <a:rPr lang="de-AT" sz="1400" dirty="0"/>
-              <a:t>Kontroller</a:t>
-            </a:r>
-          </a:p>
-        </p:txBody>
-      </p:sp>
-      <p:sp>
-        <p:nvSpPr>
           <p:cNvPr id="19" name="Textfeld 18">
             <a:extLst>
               <a:ext uri="{FF2B5EF4-FFF2-40B4-BE49-F238E27FC236}">
@@ -13247,7 +13513,7 @@
         </p:nvSpPr>
         <p:spPr>
           <a:xfrm>
-            <a:off x="5148986" y="2038109"/>
+            <a:off x="6284201" y="2765711"/>
             <a:ext cx="1016368" cy="307777"/>
           </a:xfrm>
           <a:prstGeom prst="rect">
@@ -13270,76 +13536,6 @@
       </p:sp>
       <p:sp>
         <p:nvSpPr>
-          <p:cNvPr id="20" name="Textfeld 19">
-            <a:extLst>
-              <a:ext uri="{FF2B5EF4-FFF2-40B4-BE49-F238E27FC236}">
-                <a16:creationId xmlns:a16="http://schemas.microsoft.com/office/drawing/2014/main" id="{D245454A-B984-78AE-8052-AF6AA18F18D2}"/>
-              </a:ext>
-            </a:extLst>
-          </p:cNvPr>
-          <p:cNvSpPr txBox="1"/>
-          <p:nvPr/>
-        </p:nvSpPr>
-        <p:spPr>
-          <a:xfrm>
-            <a:off x="6845450" y="2047253"/>
-            <a:ext cx="774251" cy="307777"/>
-          </a:xfrm>
-          <a:prstGeom prst="rect">
-            <a:avLst/>
-          </a:prstGeom>
-          <a:noFill/>
-        </p:spPr>
-        <p:txBody>
-          <a:bodyPr wrap="none" rtlCol="0">
-            <a:spAutoFit/>
-          </a:bodyPr>
-          <a:lstStyle/>
-          <a:p>
-            <a:r>
-              <a:rPr lang="de-AT" sz="1400" dirty="0"/>
-              <a:t>Inverter</a:t>
-            </a:r>
-          </a:p>
-        </p:txBody>
-      </p:sp>
-      <p:sp>
-        <p:nvSpPr>
-          <p:cNvPr id="21" name="Textfeld 20">
-            <a:extLst>
-              <a:ext uri="{FF2B5EF4-FFF2-40B4-BE49-F238E27FC236}">
-                <a16:creationId xmlns:a16="http://schemas.microsoft.com/office/drawing/2014/main" id="{0A5EF358-B4EF-01C0-5494-478916F5FDB0}"/>
-              </a:ext>
-            </a:extLst>
-          </p:cNvPr>
-          <p:cNvSpPr txBox="1"/>
-          <p:nvPr/>
-        </p:nvSpPr>
-        <p:spPr>
-          <a:xfrm>
-            <a:off x="6674492" y="628986"/>
-            <a:ext cx="1109663" cy="307777"/>
-          </a:xfrm>
-          <a:prstGeom prst="rect">
-            <a:avLst/>
-          </a:prstGeom>
-          <a:noFill/>
-        </p:spPr>
-        <p:txBody>
-          <a:bodyPr wrap="none" rtlCol="0">
-            <a:spAutoFit/>
-          </a:bodyPr>
-          <a:lstStyle/>
-          <a:p>
-            <a:r>
-              <a:rPr lang="de-AT" sz="1400" dirty="0"/>
-              <a:t>Erweiterung</a:t>
-            </a:r>
-          </a:p>
-        </p:txBody>
-      </p:sp>
-      <p:sp>
-        <p:nvSpPr>
           <p:cNvPr id="22" name="Textfeld 21">
             <a:extLst>
               <a:ext uri="{FF2B5EF4-FFF2-40B4-BE49-F238E27FC236}">
@@ -13352,7 +13548,7 @@
         </p:nvSpPr>
         <p:spPr>
           <a:xfrm>
-            <a:off x="5149768" y="186452"/>
+            <a:off x="4575704" y="-45753"/>
             <a:ext cx="883575" cy="307777"/>
           </a:xfrm>
           <a:prstGeom prst="rect">
@@ -13373,25 +13569,561 @@
           </a:p>
         </p:txBody>
       </p:sp>
+      <p:pic>
+        <p:nvPicPr>
+          <p:cNvPr id="31" name="Grafik 30">
+            <a:extLst>
+              <a:ext uri="{FF2B5EF4-FFF2-40B4-BE49-F238E27FC236}">
+                <a16:creationId xmlns:a16="http://schemas.microsoft.com/office/drawing/2014/main" id="{3FB7B04D-4EC6-C621-A643-F31EDBAD927C}"/>
+              </a:ext>
+            </a:extLst>
+          </p:cNvPr>
+          <p:cNvPicPr>
+            <a:picLocks noChangeAspect="1"/>
+          </p:cNvPicPr>
+          <p:nvPr/>
+        </p:nvPicPr>
+        <p:blipFill>
+          <a:blip r:embed="rId5"/>
+          <a:srcRect l="11817" b="3183"/>
+          <a:stretch/>
+        </p:blipFill>
+        <p:spPr>
+          <a:xfrm rot="19546481">
+            <a:off x="3514055" y="2283021"/>
+            <a:ext cx="568043" cy="672421"/>
+          </a:xfrm>
+          <a:prstGeom prst="rect">
+            <a:avLst/>
+          </a:prstGeom>
+        </p:spPr>
+      </p:pic>
+      <p:sp>
+        <p:nvSpPr>
+          <p:cNvPr id="32" name="Textfeld 31">
+            <a:extLst>
+              <a:ext uri="{FF2B5EF4-FFF2-40B4-BE49-F238E27FC236}">
+                <a16:creationId xmlns:a16="http://schemas.microsoft.com/office/drawing/2014/main" id="{BBA6AF97-4C0C-D52F-FC66-D9C987329203}"/>
+              </a:ext>
+            </a:extLst>
+          </p:cNvPr>
+          <p:cNvSpPr txBox="1"/>
+          <p:nvPr/>
+        </p:nvSpPr>
+        <p:spPr>
+          <a:xfrm>
+            <a:off x="3237634" y="1964507"/>
+            <a:ext cx="1120884" cy="307777"/>
+          </a:xfrm>
+          <a:prstGeom prst="rect">
+            <a:avLst/>
+          </a:prstGeom>
+          <a:noFill/>
+        </p:spPr>
+        <p:txBody>
+          <a:bodyPr wrap="none" rtlCol="0">
+            <a:spAutoFit/>
+          </a:bodyPr>
+          <a:lstStyle/>
+          <a:p>
+            <a:r>
+              <a:rPr lang="de-AT" sz="1400" dirty="0"/>
+              <a:t>Daumengas</a:t>
+            </a:r>
+          </a:p>
+        </p:txBody>
+      </p:sp>
+      <p:pic>
+        <p:nvPicPr>
+          <p:cNvPr id="3" name="Grafik 2" descr="Ein Bild, das Kopfhörer enthält.&#10;&#10;Automatisch generierte Beschreibung">
+            <a:extLst>
+              <a:ext uri="{FF2B5EF4-FFF2-40B4-BE49-F238E27FC236}">
+                <a16:creationId xmlns:a16="http://schemas.microsoft.com/office/drawing/2014/main" id="{BCDD2763-CCAE-609C-5409-0C9DE96B5663}"/>
+              </a:ext>
+            </a:extLst>
+          </p:cNvPr>
+          <p:cNvPicPr>
+            <a:picLocks noChangeAspect="1"/>
+          </p:cNvPicPr>
+          <p:nvPr/>
+        </p:nvPicPr>
+        <p:blipFill>
+          <a:blip r:embed="rId6">
+            <a:extLst>
+              <a:ext uri="{28A0092B-C50C-407E-A947-70E740481C1C}">
+                <a14:useLocalDpi xmlns:a14="http://schemas.microsoft.com/office/drawing/2010/main" val="0"/>
+              </a:ext>
+            </a:extLst>
+          </a:blip>
+          <a:stretch>
+            <a:fillRect/>
+          </a:stretch>
+        </p:blipFill>
+        <p:spPr>
+          <a:xfrm rot="10800000">
+            <a:off x="678390" y="830771"/>
+            <a:ext cx="1370370" cy="1370370"/>
+          </a:xfrm>
+          <a:prstGeom prst="rect">
+            <a:avLst/>
+          </a:prstGeom>
+        </p:spPr>
+      </p:pic>
+      <p:pic>
+        <p:nvPicPr>
+          <p:cNvPr id="8" name="Grafik 7" descr="Ein Bild, das Elektronik, Elektronisches Gerät, Gerät, Fahren enthält.&#10;&#10;Automatisch generierte Beschreibung">
+            <a:extLst>
+              <a:ext uri="{FF2B5EF4-FFF2-40B4-BE49-F238E27FC236}">
+                <a16:creationId xmlns:a16="http://schemas.microsoft.com/office/drawing/2014/main" id="{C3AE3B83-6A46-3455-2FA7-3F031BD5FAB9}"/>
+              </a:ext>
+            </a:extLst>
+          </p:cNvPr>
+          <p:cNvPicPr>
+            <a:picLocks noChangeAspect="1"/>
+          </p:cNvPicPr>
+          <p:nvPr/>
+        </p:nvPicPr>
+        <p:blipFill>
+          <a:blip r:embed="rId7">
+            <a:extLst>
+              <a:ext uri="{28A0092B-C50C-407E-A947-70E740481C1C}">
+                <a14:useLocalDpi xmlns:a14="http://schemas.microsoft.com/office/drawing/2010/main" val="0"/>
+              </a:ext>
+            </a:extLst>
+          </a:blip>
+          <a:srcRect l="24503" t="34710" r="24167" b="32999"/>
+          <a:stretch/>
+        </p:blipFill>
+        <p:spPr>
+          <a:xfrm>
+            <a:off x="4710814" y="3161723"/>
+            <a:ext cx="1496930" cy="1000539"/>
+          </a:xfrm>
+          <a:prstGeom prst="rect">
+            <a:avLst/>
+          </a:prstGeom>
+        </p:spPr>
+      </p:pic>
+      <p:sp>
+        <p:nvSpPr>
+          <p:cNvPr id="10" name="Textfeld 9">
+            <a:extLst>
+              <a:ext uri="{FF2B5EF4-FFF2-40B4-BE49-F238E27FC236}">
+                <a16:creationId xmlns:a16="http://schemas.microsoft.com/office/drawing/2014/main" id="{8C7EEDA2-2F3D-43F0-6A04-1C7711B7C360}"/>
+              </a:ext>
+            </a:extLst>
+          </p:cNvPr>
+          <p:cNvSpPr txBox="1"/>
+          <p:nvPr/>
+        </p:nvSpPr>
+        <p:spPr>
+          <a:xfrm>
+            <a:off x="4951095" y="2765711"/>
+            <a:ext cx="1083374" cy="307777"/>
+          </a:xfrm>
+          <a:prstGeom prst="rect">
+            <a:avLst/>
+          </a:prstGeom>
+          <a:noFill/>
+        </p:spPr>
+        <p:txBody>
+          <a:bodyPr wrap="none" rtlCol="0">
+            <a:spAutoFit/>
+          </a:bodyPr>
+          <a:lstStyle/>
+          <a:p>
+            <a:r>
+              <a:rPr lang="de-AT" sz="1400" dirty="0"/>
+              <a:t>Powerbank </a:t>
+            </a:r>
+          </a:p>
+        </p:txBody>
+      </p:sp>
+      <p:sp>
+        <p:nvSpPr>
+          <p:cNvPr id="12" name="Textfeld 11">
+            <a:extLst>
+              <a:ext uri="{FF2B5EF4-FFF2-40B4-BE49-F238E27FC236}">
+                <a16:creationId xmlns:a16="http://schemas.microsoft.com/office/drawing/2014/main" id="{28DACCC6-1071-F066-6AA1-22A86ACE80BD}"/>
+              </a:ext>
+            </a:extLst>
+          </p:cNvPr>
+          <p:cNvSpPr txBox="1"/>
+          <p:nvPr/>
+        </p:nvSpPr>
+        <p:spPr>
+          <a:xfrm>
+            <a:off x="4801214" y="246969"/>
+            <a:ext cx="2466509" cy="307777"/>
+          </a:xfrm>
+          <a:prstGeom prst="rect">
+            <a:avLst/>
+          </a:prstGeom>
+          <a:noFill/>
+        </p:spPr>
+        <p:txBody>
+          <a:bodyPr wrap="none" rtlCol="0">
+            <a:spAutoFit/>
+          </a:bodyPr>
+          <a:lstStyle/>
+          <a:p>
+            <a:r>
+              <a:rPr lang="de-AT" sz="1400" dirty="0"/>
+              <a:t>MCU + Motorkontroller Vorne </a:t>
+            </a:r>
+          </a:p>
+        </p:txBody>
+      </p:sp>
+      <p:pic>
+        <p:nvPicPr>
+          <p:cNvPr id="23" name="Grafik 22" descr="Ein Bild, das Schaltung, Elektronik, Elektronisches Bauteil, Elektrisches Bauelement enthält.&#10;&#10;Automatisch generierte Beschreibung">
+            <a:extLst>
+              <a:ext uri="{FF2B5EF4-FFF2-40B4-BE49-F238E27FC236}">
+                <a16:creationId xmlns:a16="http://schemas.microsoft.com/office/drawing/2014/main" id="{DBAB7E88-3210-F555-E72F-B7E250556FE5}"/>
+              </a:ext>
+            </a:extLst>
+          </p:cNvPr>
+          <p:cNvPicPr>
+            <a:picLocks noChangeAspect="1"/>
+          </p:cNvPicPr>
+          <p:nvPr/>
+        </p:nvPicPr>
+        <p:blipFill>
+          <a:blip r:embed="rId8">
+            <a:extLst>
+              <a:ext uri="{28A0092B-C50C-407E-A947-70E740481C1C}">
+                <a14:useLocalDpi xmlns:a14="http://schemas.microsoft.com/office/drawing/2010/main" val="0"/>
+              </a:ext>
+            </a:extLst>
+          </a:blip>
+          <a:stretch>
+            <a:fillRect/>
+          </a:stretch>
+        </p:blipFill>
+        <p:spPr>
+          <a:xfrm>
+            <a:off x="4924797" y="524636"/>
+            <a:ext cx="701050" cy="831913"/>
+          </a:xfrm>
+          <a:prstGeom prst="rect">
+            <a:avLst/>
+          </a:prstGeom>
+        </p:spPr>
+      </p:pic>
+      <p:pic>
+        <p:nvPicPr>
+          <p:cNvPr id="24" name="Grafik 23">
+            <a:extLst>
+              <a:ext uri="{FF2B5EF4-FFF2-40B4-BE49-F238E27FC236}">
+                <a16:creationId xmlns:a16="http://schemas.microsoft.com/office/drawing/2014/main" id="{31EA5519-A147-B8AE-9A51-E818B2ECB964}"/>
+              </a:ext>
+            </a:extLst>
+          </p:cNvPr>
+          <p:cNvPicPr>
+            <a:picLocks noChangeAspect="1"/>
+          </p:cNvPicPr>
+          <p:nvPr/>
+        </p:nvPicPr>
+        <p:blipFill>
+          <a:blip r:embed="rId9"/>
+          <a:srcRect l="24474" t="13610" r="26074" b="12895"/>
+          <a:stretch/>
+        </p:blipFill>
+        <p:spPr>
+          <a:xfrm>
+            <a:off x="6106228" y="512062"/>
+            <a:ext cx="1031974" cy="857063"/>
+          </a:xfrm>
+          <a:prstGeom prst="rect">
+            <a:avLst/>
+          </a:prstGeom>
+        </p:spPr>
+      </p:pic>
+      <p:sp>
+        <p:nvSpPr>
+          <p:cNvPr id="26" name="Textfeld 25">
+            <a:extLst>
+              <a:ext uri="{FF2B5EF4-FFF2-40B4-BE49-F238E27FC236}">
+                <a16:creationId xmlns:a16="http://schemas.microsoft.com/office/drawing/2014/main" id="{F9839EFA-B500-B4E4-04D0-C13541A3E2FC}"/>
+              </a:ext>
+            </a:extLst>
+          </p:cNvPr>
+          <p:cNvSpPr txBox="1"/>
+          <p:nvPr/>
+        </p:nvSpPr>
+        <p:spPr>
+          <a:xfrm>
+            <a:off x="4801214" y="1446121"/>
+            <a:ext cx="2535759" cy="307777"/>
+          </a:xfrm>
+          <a:prstGeom prst="rect">
+            <a:avLst/>
+          </a:prstGeom>
+          <a:noFill/>
+        </p:spPr>
+        <p:txBody>
+          <a:bodyPr wrap="none" rtlCol="0">
+            <a:spAutoFit/>
+          </a:bodyPr>
+          <a:lstStyle/>
+          <a:p>
+            <a:r>
+              <a:rPr lang="de-AT" sz="1400" dirty="0"/>
+              <a:t>MCU + Motorkontroller Hinten </a:t>
+            </a:r>
+          </a:p>
+        </p:txBody>
+      </p:sp>
+      <p:pic>
+        <p:nvPicPr>
+          <p:cNvPr id="27" name="Grafik 26" descr="Ein Bild, das Schaltung, Elektronik, Elektronisches Bauteil, Elektrisches Bauelement enthält.&#10;&#10;Automatisch generierte Beschreibung">
+            <a:extLst>
+              <a:ext uri="{FF2B5EF4-FFF2-40B4-BE49-F238E27FC236}">
+                <a16:creationId xmlns:a16="http://schemas.microsoft.com/office/drawing/2014/main" id="{3F7C0105-3C99-21DB-5715-01CF01716898}"/>
+              </a:ext>
+            </a:extLst>
+          </p:cNvPr>
+          <p:cNvPicPr>
+            <a:picLocks noChangeAspect="1"/>
+          </p:cNvPicPr>
+          <p:nvPr/>
+        </p:nvPicPr>
+        <p:blipFill>
+          <a:blip r:embed="rId8">
+            <a:extLst>
+              <a:ext uri="{28A0092B-C50C-407E-A947-70E740481C1C}">
+                <a14:useLocalDpi xmlns:a14="http://schemas.microsoft.com/office/drawing/2010/main" val="0"/>
+              </a:ext>
+            </a:extLst>
+          </a:blip>
+          <a:stretch>
+            <a:fillRect/>
+          </a:stretch>
+        </p:blipFill>
+        <p:spPr>
+          <a:xfrm>
+            <a:off x="4924797" y="1723788"/>
+            <a:ext cx="701050" cy="831913"/>
+          </a:xfrm>
+          <a:prstGeom prst="rect">
+            <a:avLst/>
+          </a:prstGeom>
+        </p:spPr>
+      </p:pic>
+      <p:pic>
+        <p:nvPicPr>
+          <p:cNvPr id="28" name="Grafik 27">
+            <a:extLst>
+              <a:ext uri="{FF2B5EF4-FFF2-40B4-BE49-F238E27FC236}">
+                <a16:creationId xmlns:a16="http://schemas.microsoft.com/office/drawing/2014/main" id="{C61091F3-F14C-0D60-95C2-26A1CAD69997}"/>
+              </a:ext>
+            </a:extLst>
+          </p:cNvPr>
+          <p:cNvPicPr>
+            <a:picLocks noChangeAspect="1"/>
+          </p:cNvPicPr>
+          <p:nvPr/>
+        </p:nvPicPr>
+        <p:blipFill>
+          <a:blip r:embed="rId9"/>
+          <a:srcRect l="24474" t="13610" r="26074" b="12895"/>
+          <a:stretch/>
+        </p:blipFill>
+        <p:spPr>
+          <a:xfrm>
+            <a:off x="6106228" y="1711214"/>
+            <a:ext cx="1031974" cy="857063"/>
+          </a:xfrm>
+          <a:prstGeom prst="rect">
+            <a:avLst/>
+          </a:prstGeom>
+        </p:spPr>
+      </p:pic>
       <p:cxnSp>
         <p:nvCxnSpPr>
-          <p:cNvPr id="25" name="Gerade Verbindung mit Pfeil 24">
+          <p:cNvPr id="33" name="Gerade Verbindung mit Pfeil 32">
             <a:extLst>
               <a:ext uri="{FF2B5EF4-FFF2-40B4-BE49-F238E27FC236}">
-                <a16:creationId xmlns:a16="http://schemas.microsoft.com/office/drawing/2014/main" id="{79008AFC-0160-9CBD-AB2E-18711C7E5DE3}"/>
+                <a16:creationId xmlns:a16="http://schemas.microsoft.com/office/drawing/2014/main" id="{6B5FA8EC-F105-72DA-815F-ACEA997E9979}"/>
               </a:ext>
             </a:extLst>
           </p:cNvPr>
           <p:cNvCxnSpPr>
-            <a:cxnSpLocks/>
             <a:stCxn id="17" idx="2"/>
           </p:cNvCxnSpPr>
           <p:nvPr/>
         </p:nvCxnSpPr>
         <p:spPr>
           <a:xfrm flipH="1">
-            <a:off x="4114800" y="3584448"/>
-            <a:ext cx="2244852" cy="665763"/>
+            <a:off x="4222016" y="4332224"/>
+            <a:ext cx="1821403" cy="599284"/>
+          </a:xfrm>
+          <a:prstGeom prst="straightConnector1">
+            <a:avLst/>
+          </a:prstGeom>
+          <a:ln>
+            <a:solidFill>
+              <a:schemeClr val="tx1"/>
+            </a:solidFill>
+            <a:tailEnd type="triangle"/>
+          </a:ln>
+        </p:spPr>
+        <p:style>
+          <a:lnRef idx="2">
+            <a:schemeClr val="accent1"/>
+          </a:lnRef>
+          <a:fillRef idx="0">
+            <a:schemeClr val="accent1"/>
+          </a:fillRef>
+          <a:effectRef idx="1">
+            <a:schemeClr val="accent1"/>
+          </a:effectRef>
+          <a:fontRef idx="minor">
+            <a:schemeClr val="tx1"/>
+          </a:fontRef>
+        </p:style>
+      </p:cxnSp>
+      <p:sp>
+        <p:nvSpPr>
+          <p:cNvPr id="34" name="Textfeld 33">
+            <a:extLst>
+              <a:ext uri="{FF2B5EF4-FFF2-40B4-BE49-F238E27FC236}">
+                <a16:creationId xmlns:a16="http://schemas.microsoft.com/office/drawing/2014/main" id="{E57BE467-682E-A429-693B-BB496FEE5525}"/>
+              </a:ext>
+            </a:extLst>
+          </p:cNvPr>
+          <p:cNvSpPr txBox="1"/>
+          <p:nvPr/>
+        </p:nvSpPr>
+        <p:spPr>
+          <a:xfrm>
+            <a:off x="5868144" y="4556397"/>
+            <a:ext cx="1808700" cy="646331"/>
+          </a:xfrm>
+          <a:prstGeom prst="rect">
+            <a:avLst/>
+          </a:prstGeom>
+          <a:noFill/>
+        </p:spPr>
+        <p:txBody>
+          <a:bodyPr wrap="none" rtlCol="0">
+            <a:spAutoFit/>
+          </a:bodyPr>
+          <a:lstStyle/>
+          <a:p>
+            <a:pPr algn="ctr"/>
+            <a:r>
+              <a:rPr lang="de-AT" dirty="0"/>
+              <a:t>BLDC-</a:t>
+            </a:r>
+          </a:p>
+          <a:p>
+            <a:pPr algn="ctr"/>
+            <a:r>
+              <a:rPr lang="de-AT" dirty="0"/>
+              <a:t>Radnabenmotor</a:t>
+            </a:r>
+          </a:p>
+        </p:txBody>
+      </p:sp>
+      <p:pic>
+        <p:nvPicPr>
+          <p:cNvPr id="35" name="Grafik 34" descr="Ein Bild, das Kopfhörer enthält.&#10;&#10;Automatisch generierte Beschreibung">
+            <a:extLst>
+              <a:ext uri="{FF2B5EF4-FFF2-40B4-BE49-F238E27FC236}">
+                <a16:creationId xmlns:a16="http://schemas.microsoft.com/office/drawing/2014/main" id="{F3EF3D8C-33A8-D2DB-F6D8-722DA91B64CF}"/>
+              </a:ext>
+            </a:extLst>
+          </p:cNvPr>
+          <p:cNvPicPr>
+            <a:picLocks noChangeAspect="1"/>
+          </p:cNvPicPr>
+          <p:nvPr/>
+        </p:nvPicPr>
+        <p:blipFill>
+          <a:blip r:embed="rId6">
+            <a:extLst>
+              <a:ext uri="{28A0092B-C50C-407E-A947-70E740481C1C}">
+                <a14:useLocalDpi xmlns:a14="http://schemas.microsoft.com/office/drawing/2010/main" val="0"/>
+              </a:ext>
+            </a:extLst>
+          </a:blip>
+          <a:stretch>
+            <a:fillRect/>
+          </a:stretch>
+        </p:blipFill>
+        <p:spPr>
+          <a:xfrm rot="10800000">
+            <a:off x="6148583" y="5099737"/>
+            <a:ext cx="1370370" cy="1370370"/>
+          </a:xfrm>
+          <a:prstGeom prst="rect">
+            <a:avLst/>
+          </a:prstGeom>
+        </p:spPr>
+      </p:pic>
+      <p:cxnSp>
+        <p:nvCxnSpPr>
+          <p:cNvPr id="37" name="Gerade Verbindung mit Pfeil 36">
+            <a:extLst>
+              <a:ext uri="{FF2B5EF4-FFF2-40B4-BE49-F238E27FC236}">
+                <a16:creationId xmlns:a16="http://schemas.microsoft.com/office/drawing/2014/main" id="{B3738ECB-BDAA-8FDB-6C17-88251F444EF8}"/>
+              </a:ext>
+            </a:extLst>
+          </p:cNvPr>
+          <p:cNvCxnSpPr>
+            <a:cxnSpLocks/>
+          </p:cNvCxnSpPr>
+          <p:nvPr/>
+        </p:nvCxnSpPr>
+        <p:spPr>
+          <a:xfrm flipH="1">
+            <a:off x="870857" y="2075109"/>
+            <a:ext cx="446314" cy="998379"/>
+          </a:xfrm>
+          <a:prstGeom prst="straightConnector1">
+            <a:avLst/>
+          </a:prstGeom>
+          <a:ln>
+            <a:solidFill>
+              <a:schemeClr val="tx1"/>
+            </a:solidFill>
+            <a:tailEnd type="triangle"/>
+          </a:ln>
+        </p:spPr>
+        <p:style>
+          <a:lnRef idx="2">
+            <a:schemeClr val="accent1"/>
+          </a:lnRef>
+          <a:fillRef idx="0">
+            <a:schemeClr val="accent1"/>
+          </a:fillRef>
+          <a:effectRef idx="1">
+            <a:schemeClr val="accent1"/>
+          </a:effectRef>
+          <a:fontRef idx="minor">
+            <a:schemeClr val="tx1"/>
+          </a:fontRef>
+        </p:style>
+      </p:cxnSp>
+      <p:cxnSp>
+        <p:nvCxnSpPr>
+          <p:cNvPr id="41" name="Gerade Verbindung mit Pfeil 40">
+            <a:extLst>
+              <a:ext uri="{FF2B5EF4-FFF2-40B4-BE49-F238E27FC236}">
+                <a16:creationId xmlns:a16="http://schemas.microsoft.com/office/drawing/2014/main" id="{A2936610-E3DD-4518-743D-5BFCE4437658}"/>
+              </a:ext>
+            </a:extLst>
+          </p:cNvPr>
+          <p:cNvCxnSpPr>
+            <a:cxnSpLocks/>
+          </p:cNvCxnSpPr>
+          <p:nvPr/>
+        </p:nvCxnSpPr>
+        <p:spPr>
+          <a:xfrm flipH="1">
+            <a:off x="5588842" y="6039057"/>
+            <a:ext cx="928916" cy="169719"/>
           </a:xfrm>
           <a:prstGeom prst="straightConnector1">
             <a:avLst/>
@@ -13420,109 +14152,10 @@
       </p:cxnSp>
       <p:pic>
         <p:nvPicPr>
-          <p:cNvPr id="29" name="Grafik 28" descr="Ein Bild, das Entwurf, Zeichnung, Kreis, Grafiken enthält.&#10;&#10;Automatisch generierte Beschreibung">
+          <p:cNvPr id="50" name="Grafik 49" descr="Ein Bild, das Diagramm, technische Zeichnung, Plan, Entwurf enthält.&#10;&#10;Automatisch generierte Beschreibung">
             <a:extLst>
               <a:ext uri="{FF2B5EF4-FFF2-40B4-BE49-F238E27FC236}">
-                <a16:creationId xmlns:a16="http://schemas.microsoft.com/office/drawing/2014/main" id="{1F54F143-8D49-D2F4-27FE-06DBB3C6AAC8}"/>
-              </a:ext>
-            </a:extLst>
-          </p:cNvPr>
-          <p:cNvPicPr>
-            <a:picLocks noChangeAspect="1"/>
-          </p:cNvPicPr>
-          <p:nvPr/>
-        </p:nvPicPr>
-        <p:blipFill>
-          <a:blip r:embed="rId8">
-            <a:extLst>
-              <a:ext uri="{28A0092B-C50C-407E-A947-70E740481C1C}">
-                <a14:useLocalDpi xmlns:a14="http://schemas.microsoft.com/office/drawing/2010/main" val="0"/>
-              </a:ext>
-            </a:extLst>
-          </a:blip>
-          <a:srcRect l="8876" t="27376" r="8902" b="34200"/>
-          <a:stretch/>
-        </p:blipFill>
-        <p:spPr>
-          <a:xfrm rot="8250219">
-            <a:off x="1221733" y="1251291"/>
-            <a:ext cx="891597" cy="444433"/>
-          </a:xfrm>
-          <a:prstGeom prst="rect">
-            <a:avLst/>
-          </a:prstGeom>
-        </p:spPr>
-      </p:pic>
-      <p:pic>
-        <p:nvPicPr>
-          <p:cNvPr id="31" name="Grafik 30">
-            <a:extLst>
-              <a:ext uri="{FF2B5EF4-FFF2-40B4-BE49-F238E27FC236}">
-                <a16:creationId xmlns:a16="http://schemas.microsoft.com/office/drawing/2014/main" id="{3FB7B04D-4EC6-C621-A643-F31EDBAD927C}"/>
-              </a:ext>
-            </a:extLst>
-          </p:cNvPr>
-          <p:cNvPicPr>
-            <a:picLocks noChangeAspect="1"/>
-          </p:cNvPicPr>
-          <p:nvPr/>
-        </p:nvPicPr>
-        <p:blipFill>
-          <a:blip r:embed="rId9"/>
-          <a:srcRect l="11817" b="3183"/>
-          <a:stretch/>
-        </p:blipFill>
-        <p:spPr>
-          <a:xfrm rot="19546481">
-            <a:off x="4015094" y="1581083"/>
-            <a:ext cx="568043" cy="672421"/>
-          </a:xfrm>
-          <a:prstGeom prst="rect">
-            <a:avLst/>
-          </a:prstGeom>
-        </p:spPr>
-      </p:pic>
-      <p:sp>
-        <p:nvSpPr>
-          <p:cNvPr id="32" name="Textfeld 31">
-            <a:extLst>
-              <a:ext uri="{FF2B5EF4-FFF2-40B4-BE49-F238E27FC236}">
-                <a16:creationId xmlns:a16="http://schemas.microsoft.com/office/drawing/2014/main" id="{BBA6AF97-4C0C-D52F-FC66-D9C987329203}"/>
-              </a:ext>
-            </a:extLst>
-          </p:cNvPr>
-          <p:cNvSpPr txBox="1"/>
-          <p:nvPr/>
-        </p:nvSpPr>
-        <p:spPr>
-          <a:xfrm>
-            <a:off x="3780092" y="1319618"/>
-            <a:ext cx="1120884" cy="307777"/>
-          </a:xfrm>
-          <a:prstGeom prst="rect">
-            <a:avLst/>
-          </a:prstGeom>
-          <a:noFill/>
-        </p:spPr>
-        <p:txBody>
-          <a:bodyPr wrap="none" rtlCol="0">
-            <a:spAutoFit/>
-          </a:bodyPr>
-          <a:lstStyle/>
-          <a:p>
-            <a:r>
-              <a:rPr lang="de-AT" sz="1400" dirty="0"/>
-              <a:t>Daumengas</a:t>
-            </a:r>
-          </a:p>
-        </p:txBody>
-      </p:sp>
-      <p:pic>
-        <p:nvPicPr>
-          <p:cNvPr id="39" name="Grafik 38" descr="Ein Bild, das Diagramm, Entwurf, Text, Zeichnung enthält.&#10;&#10;Automatisch generierte Beschreibung">
-            <a:extLst>
-              <a:ext uri="{FF2B5EF4-FFF2-40B4-BE49-F238E27FC236}">
-                <a16:creationId xmlns:a16="http://schemas.microsoft.com/office/drawing/2014/main" id="{F313D46B-8501-30C8-757C-49F565EF6B2D}"/>
+                <a16:creationId xmlns:a16="http://schemas.microsoft.com/office/drawing/2014/main" id="{81F68403-7CF7-A530-8EC2-FA7484814C77}"/>
               </a:ext>
             </a:extLst>
           </p:cNvPr>
@@ -13545,8 +14178,8 @@
         </p:blipFill>
         <p:spPr>
           <a:xfrm>
-            <a:off x="7870089" y="0"/>
-            <a:ext cx="4319171" cy="6858000"/>
+            <a:off x="7621050" y="787008"/>
+            <a:ext cx="4491478" cy="4539922"/>
           </a:xfrm>
           <a:prstGeom prst="rect">
             <a:avLst/>
@@ -13879,4 +14512,319 @@
     </a:ext>
   </a:extLst>
 </a:theme>
+</file>
+
+<file path=ppt/theme/theme2.xml><?xml version="1.0" encoding="utf-8"?>
+<a:theme xmlns:a="http://schemas.openxmlformats.org/drawingml/2006/main" name="Office">
+  <a:themeElements>
+    <a:clrScheme name="Office">
+      <a:dk1>
+        <a:sysClr val="windowText" lastClr="000000"/>
+      </a:dk1>
+      <a:lt1>
+        <a:sysClr val="window" lastClr="FFFFFF"/>
+      </a:lt1>
+      <a:dk2>
+        <a:srgbClr val="0E2841"/>
+      </a:dk2>
+      <a:lt2>
+        <a:srgbClr val="E8E8E8"/>
+      </a:lt2>
+      <a:accent1>
+        <a:srgbClr val="156082"/>
+      </a:accent1>
+      <a:accent2>
+        <a:srgbClr val="E97132"/>
+      </a:accent2>
+      <a:accent3>
+        <a:srgbClr val="196B24"/>
+      </a:accent3>
+      <a:accent4>
+        <a:srgbClr val="0F9ED5"/>
+      </a:accent4>
+      <a:accent5>
+        <a:srgbClr val="A02B93"/>
+      </a:accent5>
+      <a:accent6>
+        <a:srgbClr val="4EA72E"/>
+      </a:accent6>
+      <a:hlink>
+        <a:srgbClr val="467886"/>
+      </a:hlink>
+      <a:folHlink>
+        <a:srgbClr val="96607D"/>
+      </a:folHlink>
+    </a:clrScheme>
+    <a:fontScheme name="Office">
+      <a:majorFont>
+        <a:latin typeface="Aptos Display" panose="02110004020202020204"/>
+        <a:ea typeface=""/>
+        <a:cs typeface=""/>
+        <a:font script="Jpan" typeface="游ゴシック Light"/>
+        <a:font script="Hang" typeface="맑은 고딕"/>
+        <a:font script="Hans" typeface="等线 Light"/>
+        <a:font script="Hant" typeface="新細明體"/>
+        <a:font script="Arab" typeface="Times New Roman"/>
+        <a:font script="Hebr" typeface="Times New Roman"/>
+        <a:font script="Thai" typeface="Angsana New"/>
+        <a:font script="Ethi" typeface="Nyala"/>
+        <a:font script="Beng" typeface="Vrinda"/>
+        <a:font script="Gujr" typeface="Shruti"/>
+        <a:font script="Khmr" typeface="MoolBoran"/>
+        <a:font script="Knda" typeface="Tunga"/>
+        <a:font script="Guru" typeface="Raavi"/>
+        <a:font script="Cans" typeface="Euphemia"/>
+        <a:font script="Cher" typeface="Plantagenet Cherokee"/>
+        <a:font script="Yiii" typeface="Microsoft Yi Baiti"/>
+        <a:font script="Tibt" typeface="Microsoft Himalaya"/>
+        <a:font script="Thaa" typeface="MV Boli"/>
+        <a:font script="Deva" typeface="Mangal"/>
+        <a:font script="Telu" typeface="Gautami"/>
+        <a:font script="Taml" typeface="Latha"/>
+        <a:font script="Syrc" typeface="Estrangelo Edessa"/>
+        <a:font script="Orya" typeface="Kalinga"/>
+        <a:font script="Mlym" typeface="Kartika"/>
+        <a:font script="Laoo" typeface="DokChampa"/>
+        <a:font script="Sinh" typeface="Iskoola Pota"/>
+        <a:font script="Mong" typeface="Mongolian Baiti"/>
+        <a:font script="Viet" typeface="Times New Roman"/>
+        <a:font script="Uigh" typeface="Microsoft Uighur"/>
+        <a:font script="Geor" typeface="Sylfaen"/>
+        <a:font script="Armn" typeface="Arial"/>
+        <a:font script="Bugi" typeface="Leelawadee UI"/>
+        <a:font script="Bopo" typeface="Microsoft JhengHei"/>
+        <a:font script="Java" typeface="Javanese Text"/>
+        <a:font script="Lisu" typeface="Segoe UI"/>
+        <a:font script="Mymr" typeface="Myanmar Text"/>
+        <a:font script="Nkoo" typeface="Ebrima"/>
+        <a:font script="Olck" typeface="Nirmala UI"/>
+        <a:font script="Osma" typeface="Ebrima"/>
+        <a:font script="Phag" typeface="Phagspa"/>
+        <a:font script="Syrn" typeface="Estrangelo Edessa"/>
+        <a:font script="Syrj" typeface="Estrangelo Edessa"/>
+        <a:font script="Syre" typeface="Estrangelo Edessa"/>
+        <a:font script="Sora" typeface="Nirmala UI"/>
+        <a:font script="Tale" typeface="Microsoft Tai Le"/>
+        <a:font script="Talu" typeface="Microsoft New Tai Lue"/>
+        <a:font script="Tfng" typeface="Ebrima"/>
+      </a:majorFont>
+      <a:minorFont>
+        <a:latin typeface="Aptos" panose="02110004020202020204"/>
+        <a:ea typeface=""/>
+        <a:cs typeface=""/>
+        <a:font script="Jpan" typeface="游ゴシック"/>
+        <a:font script="Hang" typeface="맑은 고딕"/>
+        <a:font script="Hans" typeface="等线"/>
+        <a:font script="Hant" typeface="新細明體"/>
+        <a:font script="Arab" typeface="Arial"/>
+        <a:font script="Hebr" typeface="Arial"/>
+        <a:font script="Thai" typeface="Cordia New"/>
+        <a:font script="Ethi" typeface="Nyala"/>
+        <a:font script="Beng" typeface="Vrinda"/>
+        <a:font script="Gujr" typeface="Shruti"/>
+        <a:font script="Khmr" typeface="DaunPenh"/>
+        <a:font script="Knda" typeface="Tunga"/>
+        <a:font script="Guru" typeface="Raavi"/>
+        <a:font script="Cans" typeface="Euphemia"/>
+        <a:font script="Cher" typeface="Plantagenet Cherokee"/>
+        <a:font script="Yiii" typeface="Microsoft Yi Baiti"/>
+        <a:font script="Tibt" typeface="Microsoft Himalaya"/>
+        <a:font script="Thaa" typeface="MV Boli"/>
+        <a:font script="Deva" typeface="Mangal"/>
+        <a:font script="Telu" typeface="Gautami"/>
+        <a:font script="Taml" typeface="Latha"/>
+        <a:font script="Syrc" typeface="Estrangelo Edessa"/>
+        <a:font script="Orya" typeface="Kalinga"/>
+        <a:font script="Mlym" typeface="Kartika"/>
+        <a:font script="Laoo" typeface="DokChampa"/>
+        <a:font script="Sinh" typeface="Iskoola Pota"/>
+        <a:font script="Mong" typeface="Mongolian Baiti"/>
+        <a:font script="Viet" typeface="Arial"/>
+        <a:font script="Uigh" typeface="Microsoft Uighur"/>
+        <a:font script="Geor" typeface="Sylfaen"/>
+        <a:font script="Armn" typeface="Arial"/>
+        <a:font script="Bugi" typeface="Leelawadee UI"/>
+        <a:font script="Bopo" typeface="Microsoft JhengHei"/>
+        <a:font script="Java" typeface="Javanese Text"/>
+        <a:font script="Lisu" typeface="Segoe UI"/>
+        <a:font script="Mymr" typeface="Myanmar Text"/>
+        <a:font script="Nkoo" typeface="Ebrima"/>
+        <a:font script="Olck" typeface="Nirmala UI"/>
+        <a:font script="Osma" typeface="Ebrima"/>
+        <a:font script="Phag" typeface="Phagspa"/>
+        <a:font script="Syrn" typeface="Estrangelo Edessa"/>
+        <a:font script="Syrj" typeface="Estrangelo Edessa"/>
+        <a:font script="Syre" typeface="Estrangelo Edessa"/>
+        <a:font script="Sora" typeface="Nirmala UI"/>
+        <a:font script="Tale" typeface="Microsoft Tai Le"/>
+        <a:font script="Talu" typeface="Microsoft New Tai Lue"/>
+        <a:font script="Tfng" typeface="Ebrima"/>
+      </a:minorFont>
+    </a:fontScheme>
+    <a:fmtScheme name="Office">
+      <a:fillStyleLst>
+        <a:solidFill>
+          <a:schemeClr val="phClr"/>
+        </a:solidFill>
+        <a:gradFill rotWithShape="1">
+          <a:gsLst>
+            <a:gs pos="0">
+              <a:schemeClr val="phClr">
+                <a:lumMod val="110000"/>
+                <a:satMod val="105000"/>
+                <a:tint val="67000"/>
+              </a:schemeClr>
+            </a:gs>
+            <a:gs pos="50000">
+              <a:schemeClr val="phClr">
+                <a:lumMod val="105000"/>
+                <a:satMod val="103000"/>
+                <a:tint val="73000"/>
+              </a:schemeClr>
+            </a:gs>
+            <a:gs pos="100000">
+              <a:schemeClr val="phClr">
+                <a:lumMod val="105000"/>
+                <a:satMod val="109000"/>
+                <a:tint val="81000"/>
+              </a:schemeClr>
+            </a:gs>
+          </a:gsLst>
+          <a:lin ang="5400000" scaled="0"/>
+        </a:gradFill>
+        <a:gradFill rotWithShape="1">
+          <a:gsLst>
+            <a:gs pos="0">
+              <a:schemeClr val="phClr">
+                <a:satMod val="103000"/>
+                <a:lumMod val="102000"/>
+                <a:tint val="94000"/>
+              </a:schemeClr>
+            </a:gs>
+            <a:gs pos="50000">
+              <a:schemeClr val="phClr">
+                <a:satMod val="110000"/>
+                <a:lumMod val="100000"/>
+                <a:shade val="100000"/>
+              </a:schemeClr>
+            </a:gs>
+            <a:gs pos="100000">
+              <a:schemeClr val="phClr">
+                <a:lumMod val="99000"/>
+                <a:satMod val="120000"/>
+                <a:shade val="78000"/>
+              </a:schemeClr>
+            </a:gs>
+          </a:gsLst>
+          <a:lin ang="5400000" scaled="0"/>
+        </a:gradFill>
+      </a:fillStyleLst>
+      <a:lnStyleLst>
+        <a:ln w="12700" cap="flat" cmpd="sng" algn="ctr">
+          <a:solidFill>
+            <a:schemeClr val="phClr"/>
+          </a:solidFill>
+          <a:prstDash val="solid"/>
+          <a:miter lim="800000"/>
+        </a:ln>
+        <a:ln w="19050" cap="flat" cmpd="sng" algn="ctr">
+          <a:solidFill>
+            <a:schemeClr val="phClr"/>
+          </a:solidFill>
+          <a:prstDash val="solid"/>
+          <a:miter lim="800000"/>
+        </a:ln>
+        <a:ln w="25400" cap="flat" cmpd="sng" algn="ctr">
+          <a:solidFill>
+            <a:schemeClr val="phClr"/>
+          </a:solidFill>
+          <a:prstDash val="solid"/>
+          <a:miter lim="800000"/>
+        </a:ln>
+      </a:lnStyleLst>
+      <a:effectStyleLst>
+        <a:effectStyle>
+          <a:effectLst/>
+        </a:effectStyle>
+        <a:effectStyle>
+          <a:effectLst/>
+        </a:effectStyle>
+        <a:effectStyle>
+          <a:effectLst>
+            <a:outerShdw blurRad="57150" dist="19050" dir="5400000" algn="ctr" rotWithShape="0">
+              <a:srgbClr val="000000">
+                <a:alpha val="63000"/>
+              </a:srgbClr>
+            </a:outerShdw>
+          </a:effectLst>
+        </a:effectStyle>
+      </a:effectStyleLst>
+      <a:bgFillStyleLst>
+        <a:solidFill>
+          <a:schemeClr val="phClr"/>
+        </a:solidFill>
+        <a:solidFill>
+          <a:schemeClr val="phClr">
+            <a:tint val="95000"/>
+            <a:satMod val="170000"/>
+          </a:schemeClr>
+        </a:solidFill>
+        <a:gradFill rotWithShape="1">
+          <a:gsLst>
+            <a:gs pos="0">
+              <a:schemeClr val="phClr">
+                <a:tint val="93000"/>
+                <a:satMod val="150000"/>
+                <a:shade val="98000"/>
+                <a:lumMod val="102000"/>
+              </a:schemeClr>
+            </a:gs>
+            <a:gs pos="50000">
+              <a:schemeClr val="phClr">
+                <a:tint val="98000"/>
+                <a:satMod val="130000"/>
+                <a:shade val="90000"/>
+                <a:lumMod val="103000"/>
+              </a:schemeClr>
+            </a:gs>
+            <a:gs pos="100000">
+              <a:schemeClr val="phClr">
+                <a:shade val="63000"/>
+                <a:satMod val="120000"/>
+              </a:schemeClr>
+            </a:gs>
+          </a:gsLst>
+          <a:lin ang="5400000" scaled="0"/>
+        </a:gradFill>
+      </a:bgFillStyleLst>
+    </a:fmtScheme>
+  </a:themeElements>
+  <a:objectDefaults>
+    <a:lnDef>
+      <a:spPr/>
+      <a:bodyPr/>
+      <a:lstStyle/>
+      <a:style>
+        <a:lnRef idx="2">
+          <a:schemeClr val="accent1"/>
+        </a:lnRef>
+        <a:fillRef idx="0">
+          <a:schemeClr val="accent1"/>
+        </a:fillRef>
+        <a:effectRef idx="1">
+          <a:schemeClr val="accent1"/>
+        </a:effectRef>
+        <a:fontRef idx="minor">
+          <a:schemeClr val="tx1"/>
+        </a:fontRef>
+      </a:style>
+    </a:lnDef>
+  </a:objectDefaults>
+  <a:extraClrSchemeLst/>
+  <a:extLst>
+    <a:ext uri="{05A4C25C-085E-4340-85A3-A5531E510DB2}">
+      <thm15:themeFamily xmlns:thm15="http://schemas.microsoft.com/office/thememl/2012/main" name="Office Theme" id="{2E142A2C-CD16-42D6-873A-C26D2A0506FA}" vid="{1BDDFF52-6CD6-40A5-AB3C-68EB2F1E4D0A}"/>
+    </a:ext>
+  </a:extLst>
+</a:theme>
 </file>
</xml_diff>

<commit_message>
Projectmanagement: Update Schematic with old motorcontroller + mcu
</commit_message>
<xml_diff>
--- a/Projectmanagement/project_management_figures.pptx
+++ b/Projectmanagement/project_management_figures.pptx
@@ -9598,7 +9598,7 @@
           <a:p>
             <a:fld id="{E0595262-AD1F-4F89-BA9B-59C689EA9F1C}" type="datetimeFigureOut">
               <a:rPr lang="de-AT" smtClean="0"/>
-              <a:t>26.10.2024</a:t>
+              <a:t>01.11.2024</a:t>
             </a:fld>
             <a:endParaRPr lang="de-AT"/>
           </a:p>
@@ -10099,7 +10099,7 @@
           <a:p>
             <a:fld id="{ADBB3E84-333E-4841-847D-38F1CA94A2ED}" type="datetimeFigureOut">
               <a:rPr lang="de-AT" smtClean="0"/>
-              <a:t>26.10.2024</a:t>
+              <a:t>01.11.2024</a:t>
             </a:fld>
             <a:endParaRPr lang="de-AT"/>
           </a:p>
@@ -10299,7 +10299,7 @@
           <a:p>
             <a:fld id="{ADBB3E84-333E-4841-847D-38F1CA94A2ED}" type="datetimeFigureOut">
               <a:rPr lang="de-AT" smtClean="0"/>
-              <a:t>26.10.2024</a:t>
+              <a:t>01.11.2024</a:t>
             </a:fld>
             <a:endParaRPr lang="de-AT"/>
           </a:p>
@@ -10509,7 +10509,7 @@
           <a:p>
             <a:fld id="{ADBB3E84-333E-4841-847D-38F1CA94A2ED}" type="datetimeFigureOut">
               <a:rPr lang="de-AT" smtClean="0"/>
-              <a:t>26.10.2024</a:t>
+              <a:t>01.11.2024</a:t>
             </a:fld>
             <a:endParaRPr lang="de-AT"/>
           </a:p>
@@ -10709,7 +10709,7 @@
           <a:p>
             <a:fld id="{ADBB3E84-333E-4841-847D-38F1CA94A2ED}" type="datetimeFigureOut">
               <a:rPr lang="de-AT" smtClean="0"/>
-              <a:t>26.10.2024</a:t>
+              <a:t>01.11.2024</a:t>
             </a:fld>
             <a:endParaRPr lang="de-AT"/>
           </a:p>
@@ -10985,7 +10985,7 @@
           <a:p>
             <a:fld id="{ADBB3E84-333E-4841-847D-38F1CA94A2ED}" type="datetimeFigureOut">
               <a:rPr lang="de-AT" smtClean="0"/>
-              <a:t>26.10.2024</a:t>
+              <a:t>01.11.2024</a:t>
             </a:fld>
             <a:endParaRPr lang="de-AT"/>
           </a:p>
@@ -11253,7 +11253,7 @@
           <a:p>
             <a:fld id="{ADBB3E84-333E-4841-847D-38F1CA94A2ED}" type="datetimeFigureOut">
               <a:rPr lang="de-AT" smtClean="0"/>
-              <a:t>26.10.2024</a:t>
+              <a:t>01.11.2024</a:t>
             </a:fld>
             <a:endParaRPr lang="de-AT"/>
           </a:p>
@@ -11668,7 +11668,7 @@
           <a:p>
             <a:fld id="{ADBB3E84-333E-4841-847D-38F1CA94A2ED}" type="datetimeFigureOut">
               <a:rPr lang="de-AT" smtClean="0"/>
-              <a:t>26.10.2024</a:t>
+              <a:t>01.11.2024</a:t>
             </a:fld>
             <a:endParaRPr lang="de-AT"/>
           </a:p>
@@ -11810,7 +11810,7 @@
           <a:p>
             <a:fld id="{ADBB3E84-333E-4841-847D-38F1CA94A2ED}" type="datetimeFigureOut">
               <a:rPr lang="de-AT" smtClean="0"/>
-              <a:t>26.10.2024</a:t>
+              <a:t>01.11.2024</a:t>
             </a:fld>
             <a:endParaRPr lang="de-AT"/>
           </a:p>
@@ -11923,7 +11923,7 @@
           <a:p>
             <a:fld id="{ADBB3E84-333E-4841-847D-38F1CA94A2ED}" type="datetimeFigureOut">
               <a:rPr lang="de-AT" smtClean="0"/>
-              <a:t>26.10.2024</a:t>
+              <a:t>01.11.2024</a:t>
             </a:fld>
             <a:endParaRPr lang="de-AT"/>
           </a:p>
@@ -12236,7 +12236,7 @@
           <a:p>
             <a:fld id="{ADBB3E84-333E-4841-847D-38F1CA94A2ED}" type="datetimeFigureOut">
               <a:rPr lang="de-AT" smtClean="0"/>
-              <a:t>26.10.2024</a:t>
+              <a:t>01.11.2024</a:t>
             </a:fld>
             <a:endParaRPr lang="de-AT"/>
           </a:p>
@@ -12525,7 +12525,7 @@
           <a:p>
             <a:fld id="{ADBB3E84-333E-4841-847D-38F1CA94A2ED}" type="datetimeFigureOut">
               <a:rPr lang="de-AT" smtClean="0"/>
-              <a:t>26.10.2024</a:t>
+              <a:t>01.11.2024</a:t>
             </a:fld>
             <a:endParaRPr lang="de-AT"/>
           </a:p>
@@ -12768,7 +12768,7 @@
           <a:p>
             <a:fld id="{ADBB3E84-333E-4841-847D-38F1CA94A2ED}" type="datetimeFigureOut">
               <a:rPr lang="de-AT" smtClean="0"/>
-              <a:t>26.10.2024</a:t>
+              <a:t>01.11.2024</a:t>
             </a:fld>
             <a:endParaRPr lang="de-AT"/>
           </a:p>
@@ -13774,71 +13774,6 @@
           </a:p>
         </p:txBody>
       </p:sp>
-      <p:pic>
-        <p:nvPicPr>
-          <p:cNvPr id="23" name="Grafik 22" descr="Ein Bild, das Schaltung, Elektronik, Elektronisches Bauteil, Elektrisches Bauelement enthält.&#10;&#10;Automatisch generierte Beschreibung">
-            <a:extLst>
-              <a:ext uri="{FF2B5EF4-FFF2-40B4-BE49-F238E27FC236}">
-                <a16:creationId xmlns:a16="http://schemas.microsoft.com/office/drawing/2014/main" id="{DBAB7E88-3210-F555-E72F-B7E250556FE5}"/>
-              </a:ext>
-            </a:extLst>
-          </p:cNvPr>
-          <p:cNvPicPr>
-            <a:picLocks noChangeAspect="1"/>
-          </p:cNvPicPr>
-          <p:nvPr/>
-        </p:nvPicPr>
-        <p:blipFill>
-          <a:blip r:embed="rId8">
-            <a:extLst>
-              <a:ext uri="{28A0092B-C50C-407E-A947-70E740481C1C}">
-                <a14:useLocalDpi xmlns:a14="http://schemas.microsoft.com/office/drawing/2010/main" val="0"/>
-              </a:ext>
-            </a:extLst>
-          </a:blip>
-          <a:stretch>
-            <a:fillRect/>
-          </a:stretch>
-        </p:blipFill>
-        <p:spPr>
-          <a:xfrm>
-            <a:off x="4924797" y="524636"/>
-            <a:ext cx="701050" cy="831913"/>
-          </a:xfrm>
-          <a:prstGeom prst="rect">
-            <a:avLst/>
-          </a:prstGeom>
-        </p:spPr>
-      </p:pic>
-      <p:pic>
-        <p:nvPicPr>
-          <p:cNvPr id="24" name="Grafik 23">
-            <a:extLst>
-              <a:ext uri="{FF2B5EF4-FFF2-40B4-BE49-F238E27FC236}">
-                <a16:creationId xmlns:a16="http://schemas.microsoft.com/office/drawing/2014/main" id="{31EA5519-A147-B8AE-9A51-E818B2ECB964}"/>
-              </a:ext>
-            </a:extLst>
-          </p:cNvPr>
-          <p:cNvPicPr>
-            <a:picLocks noChangeAspect="1"/>
-          </p:cNvPicPr>
-          <p:nvPr/>
-        </p:nvPicPr>
-        <p:blipFill>
-          <a:blip r:embed="rId9"/>
-          <a:srcRect l="24474" t="13610" r="26074" b="12895"/>
-          <a:stretch/>
-        </p:blipFill>
-        <p:spPr>
-          <a:xfrm>
-            <a:off x="6106228" y="512062"/>
-            <a:ext cx="1031974" cy="857063"/>
-          </a:xfrm>
-          <a:prstGeom prst="rect">
-            <a:avLst/>
-          </a:prstGeom>
-        </p:spPr>
-      </p:pic>
       <p:sp>
         <p:nvSpPr>
           <p:cNvPr id="26" name="Textfeld 25">
@@ -13874,71 +13809,6 @@
           </a:p>
         </p:txBody>
       </p:sp>
-      <p:pic>
-        <p:nvPicPr>
-          <p:cNvPr id="27" name="Grafik 26" descr="Ein Bild, das Schaltung, Elektronik, Elektronisches Bauteil, Elektrisches Bauelement enthält.&#10;&#10;Automatisch generierte Beschreibung">
-            <a:extLst>
-              <a:ext uri="{FF2B5EF4-FFF2-40B4-BE49-F238E27FC236}">
-                <a16:creationId xmlns:a16="http://schemas.microsoft.com/office/drawing/2014/main" id="{3F7C0105-3C99-21DB-5715-01CF01716898}"/>
-              </a:ext>
-            </a:extLst>
-          </p:cNvPr>
-          <p:cNvPicPr>
-            <a:picLocks noChangeAspect="1"/>
-          </p:cNvPicPr>
-          <p:nvPr/>
-        </p:nvPicPr>
-        <p:blipFill>
-          <a:blip r:embed="rId8">
-            <a:extLst>
-              <a:ext uri="{28A0092B-C50C-407E-A947-70E740481C1C}">
-                <a14:useLocalDpi xmlns:a14="http://schemas.microsoft.com/office/drawing/2010/main" val="0"/>
-              </a:ext>
-            </a:extLst>
-          </a:blip>
-          <a:stretch>
-            <a:fillRect/>
-          </a:stretch>
-        </p:blipFill>
-        <p:spPr>
-          <a:xfrm>
-            <a:off x="4924797" y="1723788"/>
-            <a:ext cx="701050" cy="831913"/>
-          </a:xfrm>
-          <a:prstGeom prst="rect">
-            <a:avLst/>
-          </a:prstGeom>
-        </p:spPr>
-      </p:pic>
-      <p:pic>
-        <p:nvPicPr>
-          <p:cNvPr id="28" name="Grafik 27">
-            <a:extLst>
-              <a:ext uri="{FF2B5EF4-FFF2-40B4-BE49-F238E27FC236}">
-                <a16:creationId xmlns:a16="http://schemas.microsoft.com/office/drawing/2014/main" id="{C61091F3-F14C-0D60-95C2-26A1CAD69997}"/>
-              </a:ext>
-            </a:extLst>
-          </p:cNvPr>
-          <p:cNvPicPr>
-            <a:picLocks noChangeAspect="1"/>
-          </p:cNvPicPr>
-          <p:nvPr/>
-        </p:nvPicPr>
-        <p:blipFill>
-          <a:blip r:embed="rId9"/>
-          <a:srcRect l="24474" t="13610" r="26074" b="12895"/>
-          <a:stretch/>
-        </p:blipFill>
-        <p:spPr>
-          <a:xfrm>
-            <a:off x="6106228" y="1711214"/>
-            <a:ext cx="1031974" cy="857063"/>
-          </a:xfrm>
-          <a:prstGeom prst="rect">
-            <a:avLst/>
-          </a:prstGeom>
-        </p:spPr>
-      </p:pic>
       <p:cxnSp>
         <p:nvCxnSpPr>
           <p:cNvPr id="33" name="Gerade Verbindung mit Pfeil 32">
@@ -14152,10 +14022,10 @@
       </p:cxnSp>
       <p:pic>
         <p:nvPicPr>
-          <p:cNvPr id="50" name="Grafik 49" descr="Ein Bild, das Diagramm, technische Zeichnung, Plan, Entwurf enthält.&#10;&#10;Automatisch generierte Beschreibung">
+          <p:cNvPr id="4" name="Grafik 3">
             <a:extLst>
               <a:ext uri="{FF2B5EF4-FFF2-40B4-BE49-F238E27FC236}">
-                <a16:creationId xmlns:a16="http://schemas.microsoft.com/office/drawing/2014/main" id="{81F68403-7CF7-A530-8EC2-FA7484814C77}"/>
+                <a16:creationId xmlns:a16="http://schemas.microsoft.com/office/drawing/2014/main" id="{EBCE86D1-CEB5-080C-567E-F54E8DC9FA0C}"/>
               </a:ext>
             </a:extLst>
           </p:cNvPr>
@@ -14165,7 +14035,67 @@
           <p:nvPr/>
         </p:nvPicPr>
         <p:blipFill>
-          <a:blip r:embed="rId10">
+          <a:blip r:embed="rId8"/>
+          <a:stretch>
+            <a:fillRect/>
+          </a:stretch>
+        </p:blipFill>
+        <p:spPr>
+          <a:xfrm>
+            <a:off x="5434043" y="541322"/>
+            <a:ext cx="1200849" cy="786330"/>
+          </a:xfrm>
+          <a:prstGeom prst="rect">
+            <a:avLst/>
+          </a:prstGeom>
+        </p:spPr>
+      </p:pic>
+      <p:pic>
+        <p:nvPicPr>
+          <p:cNvPr id="6" name="Grafik 5">
+            <a:extLst>
+              <a:ext uri="{FF2B5EF4-FFF2-40B4-BE49-F238E27FC236}">
+                <a16:creationId xmlns:a16="http://schemas.microsoft.com/office/drawing/2014/main" id="{ADE9BB93-7330-DF82-FA1E-A34799F854ED}"/>
+              </a:ext>
+            </a:extLst>
+          </p:cNvPr>
+          <p:cNvPicPr>
+            <a:picLocks noChangeAspect="1"/>
+          </p:cNvPicPr>
+          <p:nvPr/>
+        </p:nvPicPr>
+        <p:blipFill>
+          <a:blip r:embed="rId8"/>
+          <a:stretch>
+            <a:fillRect/>
+          </a:stretch>
+        </p:blipFill>
+        <p:spPr>
+          <a:xfrm>
+            <a:off x="5429933" y="1738193"/>
+            <a:ext cx="1200849" cy="786330"/>
+          </a:xfrm>
+          <a:prstGeom prst="rect">
+            <a:avLst/>
+          </a:prstGeom>
+        </p:spPr>
+      </p:pic>
+      <p:pic>
+        <p:nvPicPr>
+          <p:cNvPr id="9" name="Grafik 8" descr="Ein Bild, das Diagramm, technische Zeichnung, Plan, Entwurf enthält.&#10;&#10;Automatisch generierte Beschreibung">
+            <a:extLst>
+              <a:ext uri="{FF2B5EF4-FFF2-40B4-BE49-F238E27FC236}">
+                <a16:creationId xmlns:a16="http://schemas.microsoft.com/office/drawing/2014/main" id="{32E4D5B3-A525-1EA9-B62B-0B6DBF75CA85}"/>
+              </a:ext>
+            </a:extLst>
+          </p:cNvPr>
+          <p:cNvPicPr>
+            <a:picLocks noChangeAspect="1"/>
+          </p:cNvPicPr>
+          <p:nvPr/>
+        </p:nvPicPr>
+        <p:blipFill>
+          <a:blip r:embed="rId9">
             <a:extLst>
               <a:ext uri="{28A0092B-C50C-407E-A947-70E740481C1C}">
                 <a14:useLocalDpi xmlns:a14="http://schemas.microsoft.com/office/drawing/2010/main" val="0"/>
@@ -14178,8 +14108,8 @@
         </p:blipFill>
         <p:spPr>
           <a:xfrm>
-            <a:off x="7621050" y="787008"/>
-            <a:ext cx="4491478" cy="4539922"/>
+            <a:off x="7634382" y="1183562"/>
+            <a:ext cx="4552489" cy="4490876"/>
           </a:xfrm>
           <a:prstGeom prst="rect">
             <a:avLst/>

</xml_diff>

<commit_message>
Add battery to overview picture
</commit_message>
<xml_diff>
--- a/Projectmanagement/project_management_figures.pptx
+++ b/Projectmanagement/project_management_figures.pptx
@@ -9598,7 +9598,7 @@
           <a:p>
             <a:fld id="{E0595262-AD1F-4F89-BA9B-59C689EA9F1C}" type="datetimeFigureOut">
               <a:rPr lang="de-AT" smtClean="0"/>
-              <a:t>01.11.2024</a:t>
+              <a:t>01.03.2025</a:t>
             </a:fld>
             <a:endParaRPr lang="de-AT"/>
           </a:p>
@@ -10099,7 +10099,7 @@
           <a:p>
             <a:fld id="{ADBB3E84-333E-4841-847D-38F1CA94A2ED}" type="datetimeFigureOut">
               <a:rPr lang="de-AT" smtClean="0"/>
-              <a:t>01.11.2024</a:t>
+              <a:t>01.03.2025</a:t>
             </a:fld>
             <a:endParaRPr lang="de-AT"/>
           </a:p>
@@ -10299,7 +10299,7 @@
           <a:p>
             <a:fld id="{ADBB3E84-333E-4841-847D-38F1CA94A2ED}" type="datetimeFigureOut">
               <a:rPr lang="de-AT" smtClean="0"/>
-              <a:t>01.11.2024</a:t>
+              <a:t>01.03.2025</a:t>
             </a:fld>
             <a:endParaRPr lang="de-AT"/>
           </a:p>
@@ -10509,7 +10509,7 @@
           <a:p>
             <a:fld id="{ADBB3E84-333E-4841-847D-38F1CA94A2ED}" type="datetimeFigureOut">
               <a:rPr lang="de-AT" smtClean="0"/>
-              <a:t>01.11.2024</a:t>
+              <a:t>01.03.2025</a:t>
             </a:fld>
             <a:endParaRPr lang="de-AT"/>
           </a:p>
@@ -10709,7 +10709,7 @@
           <a:p>
             <a:fld id="{ADBB3E84-333E-4841-847D-38F1CA94A2ED}" type="datetimeFigureOut">
               <a:rPr lang="de-AT" smtClean="0"/>
-              <a:t>01.11.2024</a:t>
+              <a:t>01.03.2025</a:t>
             </a:fld>
             <a:endParaRPr lang="de-AT"/>
           </a:p>
@@ -10985,7 +10985,7 @@
           <a:p>
             <a:fld id="{ADBB3E84-333E-4841-847D-38F1CA94A2ED}" type="datetimeFigureOut">
               <a:rPr lang="de-AT" smtClean="0"/>
-              <a:t>01.11.2024</a:t>
+              <a:t>01.03.2025</a:t>
             </a:fld>
             <a:endParaRPr lang="de-AT"/>
           </a:p>
@@ -11253,7 +11253,7 @@
           <a:p>
             <a:fld id="{ADBB3E84-333E-4841-847D-38F1CA94A2ED}" type="datetimeFigureOut">
               <a:rPr lang="de-AT" smtClean="0"/>
-              <a:t>01.11.2024</a:t>
+              <a:t>01.03.2025</a:t>
             </a:fld>
             <a:endParaRPr lang="de-AT"/>
           </a:p>
@@ -11668,7 +11668,7 @@
           <a:p>
             <a:fld id="{ADBB3E84-333E-4841-847D-38F1CA94A2ED}" type="datetimeFigureOut">
               <a:rPr lang="de-AT" smtClean="0"/>
-              <a:t>01.11.2024</a:t>
+              <a:t>01.03.2025</a:t>
             </a:fld>
             <a:endParaRPr lang="de-AT"/>
           </a:p>
@@ -11810,7 +11810,7 @@
           <a:p>
             <a:fld id="{ADBB3E84-333E-4841-847D-38F1CA94A2ED}" type="datetimeFigureOut">
               <a:rPr lang="de-AT" smtClean="0"/>
-              <a:t>01.11.2024</a:t>
+              <a:t>01.03.2025</a:t>
             </a:fld>
             <a:endParaRPr lang="de-AT"/>
           </a:p>
@@ -11923,7 +11923,7 @@
           <a:p>
             <a:fld id="{ADBB3E84-333E-4841-847D-38F1CA94A2ED}" type="datetimeFigureOut">
               <a:rPr lang="de-AT" smtClean="0"/>
-              <a:t>01.11.2024</a:t>
+              <a:t>01.03.2025</a:t>
             </a:fld>
             <a:endParaRPr lang="de-AT"/>
           </a:p>
@@ -12236,7 +12236,7 @@
           <a:p>
             <a:fld id="{ADBB3E84-333E-4841-847D-38F1CA94A2ED}" type="datetimeFigureOut">
               <a:rPr lang="de-AT" smtClean="0"/>
-              <a:t>01.11.2024</a:t>
+              <a:t>01.03.2025</a:t>
             </a:fld>
             <a:endParaRPr lang="de-AT"/>
           </a:p>
@@ -12525,7 +12525,7 @@
           <a:p>
             <a:fld id="{ADBB3E84-333E-4841-847D-38F1CA94A2ED}" type="datetimeFigureOut">
               <a:rPr lang="de-AT" smtClean="0"/>
-              <a:t>01.11.2024</a:t>
+              <a:t>01.03.2025</a:t>
             </a:fld>
             <a:endParaRPr lang="de-AT"/>
           </a:p>
@@ -12768,7 +12768,7 @@
           <a:p>
             <a:fld id="{ADBB3E84-333E-4841-847D-38F1CA94A2ED}" type="datetimeFigureOut">
               <a:rPr lang="de-AT" smtClean="0"/>
-              <a:t>01.11.2024</a:t>
+              <a:t>01.03.2025</a:t>
             </a:fld>
             <a:endParaRPr lang="de-AT"/>
           </a:p>
@@ -13401,8 +13401,8 @@
         </p:blipFill>
         <p:spPr>
           <a:xfrm>
-            <a:off x="6415571" y="3032528"/>
-            <a:ext cx="722631" cy="1299696"/>
+            <a:off x="6776495" y="3096536"/>
+            <a:ext cx="361707" cy="650552"/>
           </a:xfrm>
           <a:prstGeom prst="rect">
             <a:avLst/>
@@ -13513,7 +13513,7 @@
         </p:nvSpPr>
         <p:spPr>
           <a:xfrm>
-            <a:off x="6284201" y="2765711"/>
+            <a:off x="6384785" y="2765711"/>
             <a:ext cx="1016368" cy="307777"/>
           </a:xfrm>
           <a:prstGeom prst="rect">
@@ -13697,7 +13697,7 @@
         <p:spPr>
           <a:xfrm>
             <a:off x="4710814" y="3161723"/>
-            <a:ext cx="1496930" cy="1000539"/>
+            <a:ext cx="878028" cy="586869"/>
           </a:xfrm>
           <a:prstGeom prst="rect">
             <a:avLst/>
@@ -13718,7 +13718,7 @@
         </p:nvSpPr>
         <p:spPr>
           <a:xfrm>
-            <a:off x="4951095" y="2765711"/>
+            <a:off x="4713351" y="2765711"/>
             <a:ext cx="1083374" cy="307777"/>
           </a:xfrm>
           <a:prstGeom prst="rect">
@@ -14110,6 +14110,77 @@
           <a:xfrm>
             <a:off x="7634382" y="1183562"/>
             <a:ext cx="4552489" cy="4490876"/>
+          </a:xfrm>
+          <a:prstGeom prst="rect">
+            <a:avLst/>
+          </a:prstGeom>
+        </p:spPr>
+      </p:pic>
+      <p:sp>
+        <p:nvSpPr>
+          <p:cNvPr id="2" name="Textfeld 1">
+            <a:extLst>
+              <a:ext uri="{FF2B5EF4-FFF2-40B4-BE49-F238E27FC236}">
+                <a16:creationId xmlns:a16="http://schemas.microsoft.com/office/drawing/2014/main" id="{0DE59FC6-CEE6-9E6A-3193-FF09149AD479}"/>
+              </a:ext>
+            </a:extLst>
+          </p:cNvPr>
+          <p:cNvSpPr txBox="1"/>
+          <p:nvPr/>
+        </p:nvSpPr>
+        <p:spPr>
+          <a:xfrm>
+            <a:off x="5666637" y="2761882"/>
+            <a:ext cx="794513" cy="307777"/>
+          </a:xfrm>
+          <a:prstGeom prst="rect">
+            <a:avLst/>
+          </a:prstGeom>
+          <a:noFill/>
+        </p:spPr>
+        <p:txBody>
+          <a:bodyPr wrap="none" rtlCol="0">
+            <a:spAutoFit/>
+          </a:bodyPr>
+          <a:lstStyle/>
+          <a:p>
+            <a:r>
+              <a:rPr lang="de-AT" sz="1400" dirty="0"/>
+              <a:t>Batterie</a:t>
+            </a:r>
+          </a:p>
+        </p:txBody>
+      </p:sp>
+      <p:pic>
+        <p:nvPicPr>
+          <p:cNvPr id="11" name="Grafik 10" descr="Ein Bild, das Text, Allgemeine Versorgung enthält.&#10;&#10;KI-generierte Inhalte können fehlerhaft sein.">
+            <a:extLst>
+              <a:ext uri="{FF2B5EF4-FFF2-40B4-BE49-F238E27FC236}">
+                <a16:creationId xmlns:a16="http://schemas.microsoft.com/office/drawing/2014/main" id="{0A584D66-D969-A6E4-D7D4-3FEB4F427D4C}"/>
+              </a:ext>
+            </a:extLst>
+          </p:cNvPr>
+          <p:cNvPicPr>
+            <a:picLocks noChangeAspect="1"/>
+          </p:cNvPicPr>
+          <p:nvPr/>
+        </p:nvPicPr>
+        <p:blipFill>
+          <a:blip r:embed="rId10">
+            <a:extLst>
+              <a:ext uri="{28A0092B-C50C-407E-A947-70E740481C1C}">
+                <a14:useLocalDpi xmlns:a14="http://schemas.microsoft.com/office/drawing/2010/main" val="0"/>
+              </a:ext>
+            </a:extLst>
+          </a:blip>
+          <a:stretch>
+            <a:fillRect/>
+          </a:stretch>
+        </p:blipFill>
+        <p:spPr>
+          <a:xfrm>
+            <a:off x="5626446" y="2985800"/>
+            <a:ext cx="932637" cy="932637"/>
           </a:xfrm>
           <a:prstGeom prst="rect">
             <a:avLst/>

</xml_diff>